<commit_message>
update Android onTouchEvent contents
</commit_message>
<xml_diff>
--- a/Home/Android/Android_onTouchEvent.pptx
+++ b/Home/Android/Android_onTouchEvent.pptx
@@ -5,10 +5,12 @@
     <p:sldMasterId id="2147483648" r:id="rId1"/>
   </p:sldMasterIdLst>
   <p:notesMasterIdLst>
-    <p:notesMasterId r:id="rId3"/>
+    <p:notesMasterId r:id="rId5"/>
   </p:notesMasterIdLst>
   <p:sldIdLst>
     <p:sldId id="256" r:id="rId2"/>
+    <p:sldId id="257" r:id="rId3"/>
+    <p:sldId id="258" r:id="rId4"/>
   </p:sldIdLst>
   <p:sldSz cx="12192000" cy="6858000"/>
   <p:notesSz cx="6858000" cy="9144000"/>
@@ -107,6 +109,11 @@
       </a:defRPr>
     </a:lvl9pPr>
   </p:defaultTextStyle>
+  <p:extLst>
+    <p:ext uri="{EFAFB233-063F-42B5-8137-9DF3F51BA10A}">
+      <p15:sldGuideLst xmlns:p15="http://schemas.microsoft.com/office/powerpoint/2012/main"/>
+    </p:ext>
+  </p:extLst>
 </p:presentation>
 </file>
 
@@ -504,7 +511,7 @@
           <a:bodyPr/>
           <a:lstStyle/>
           <a:p>
-            <a:endParaRPr kumimoji="1" lang="ko-KR" altLang="en-US"/>
+            <a:endParaRPr kumimoji="1" lang="ko-KR" altLang="en-US" dirty="0"/>
           </a:p>
         </p:txBody>
       </p:sp>
@@ -3787,6 +3794,2954 @@
     <p:extLst>
       <p:ext uri="{BB962C8B-B14F-4D97-AF65-F5344CB8AC3E}">
         <p14:creationId xmlns:p14="http://schemas.microsoft.com/office/powerpoint/2010/main" val="978910888"/>
+      </p:ext>
+    </p:extLst>
+  </p:cSld>
+  <p:clrMapOvr>
+    <a:masterClrMapping/>
+  </p:clrMapOvr>
+</p:sld>
+</file>
+
+<file path=ppt/slides/slide2.xml><?xml version="1.0" encoding="utf-8"?>
+<p:sld xmlns:a="http://schemas.openxmlformats.org/drawingml/2006/main" xmlns:r="http://schemas.openxmlformats.org/officeDocument/2006/relationships" xmlns:p="http://schemas.openxmlformats.org/presentationml/2006/main">
+  <p:cSld>
+    <p:spTree>
+      <p:nvGrpSpPr>
+        <p:cNvPr id="1" name=""/>
+        <p:cNvGrpSpPr/>
+        <p:nvPr/>
+      </p:nvGrpSpPr>
+      <p:grpSpPr>
+        <a:xfrm>
+          <a:off x="0" y="0"/>
+          <a:ext cx="0" cy="0"/>
+          <a:chOff x="0" y="0"/>
+          <a:chExt cx="0" cy="0"/>
+        </a:xfrm>
+      </p:grpSpPr>
+      <p:sp>
+        <p:nvSpPr>
+          <p:cNvPr id="2" name="제목 1"/>
+          <p:cNvSpPr>
+            <a:spLocks noGrp="1"/>
+          </p:cNvSpPr>
+          <p:nvPr>
+            <p:ph type="title"/>
+          </p:nvPr>
+        </p:nvSpPr>
+        <p:spPr/>
+        <p:txBody>
+          <a:bodyPr/>
+          <a:lstStyle/>
+          <a:p>
+            <a:r>
+              <a:rPr kumimoji="1" lang="en-US" altLang="ko-KR" dirty="0" smtClean="0"/>
+              <a:t>How Android Handles Touches</a:t>
+            </a:r>
+            <a:endParaRPr kumimoji="1" lang="ko-KR" altLang="en-US" dirty="0"/>
+          </a:p>
+        </p:txBody>
+      </p:sp>
+      <p:sp>
+        <p:nvSpPr>
+          <p:cNvPr id="3" name="내용 개체 틀 2"/>
+          <p:cNvSpPr>
+            <a:spLocks noGrp="1"/>
+          </p:cNvSpPr>
+          <p:nvPr>
+            <p:ph idx="1"/>
+          </p:nvPr>
+        </p:nvSpPr>
+        <p:spPr/>
+        <p:txBody>
+          <a:bodyPr>
+            <a:normAutofit/>
+          </a:bodyPr>
+          <a:lstStyle/>
+          <a:p>
+            <a:r>
+              <a:rPr kumimoji="1" lang="en-US" altLang="ko-KR" sz="1800" dirty="0" smtClean="0"/>
+              <a:t>Each user touch event is wrapped up as </a:t>
+            </a:r>
+            <a:r>
+              <a:rPr kumimoji="1" lang="en-US" altLang="ko-KR" sz="1800" dirty="0" err="1" smtClean="0"/>
+              <a:t>MotionEvent</a:t>
+            </a:r>
+            <a:endParaRPr kumimoji="1" lang="en-US" altLang="ko-KR" sz="1800" dirty="0" smtClean="0"/>
+          </a:p>
+          <a:p>
+            <a:r>
+              <a:rPr kumimoji="1" lang="en-US" altLang="ko-KR" sz="1800" dirty="0" smtClean="0"/>
+              <a:t>Describe user’s current action</a:t>
+            </a:r>
+          </a:p>
+          <a:p>
+            <a:pPr lvl="1"/>
+            <a:r>
+              <a:rPr kumimoji="1" lang="en-US" altLang="ko-KR" sz="1400" dirty="0" smtClean="0"/>
+              <a:t>ACTION_DOWN</a:t>
+            </a:r>
+          </a:p>
+          <a:p>
+            <a:pPr lvl="1"/>
+            <a:r>
+              <a:rPr kumimoji="1" lang="en-US" altLang="ko-KR" sz="1400" dirty="0" smtClean="0"/>
+              <a:t>ACTION_UP</a:t>
+            </a:r>
+          </a:p>
+          <a:p>
+            <a:pPr lvl="1"/>
+            <a:r>
+              <a:rPr kumimoji="1" lang="en-US" altLang="ko-KR" sz="1400" dirty="0" smtClean="0"/>
+              <a:t>ACTION_MOVE</a:t>
+            </a:r>
+          </a:p>
+          <a:p>
+            <a:pPr lvl="1"/>
+            <a:r>
+              <a:rPr kumimoji="1" lang="en-US" altLang="ko-KR" sz="1400" dirty="0" smtClean="0"/>
+              <a:t>ACTION_POINTER_DOWN</a:t>
+            </a:r>
+          </a:p>
+          <a:p>
+            <a:pPr lvl="1"/>
+            <a:r>
+              <a:rPr kumimoji="1" lang="en-US" altLang="ko-KR" sz="1400" dirty="0" smtClean="0"/>
+              <a:t>ACTION_POINTER_UP</a:t>
+            </a:r>
+          </a:p>
+          <a:p>
+            <a:pPr lvl="1"/>
+            <a:r>
+              <a:rPr kumimoji="1" lang="en-US" altLang="ko-KR" sz="1400" dirty="0" smtClean="0"/>
+              <a:t>ACTION_CANCEL</a:t>
+            </a:r>
+          </a:p>
+          <a:p>
+            <a:r>
+              <a:rPr kumimoji="1" lang="en-US" altLang="ko-KR" sz="1800" dirty="0" smtClean="0"/>
+              <a:t>Event metadata included</a:t>
+            </a:r>
+          </a:p>
+          <a:p>
+            <a:pPr lvl="1"/>
+            <a:r>
+              <a:rPr kumimoji="1" lang="en-US" altLang="ko-KR" sz="1400" dirty="0" smtClean="0"/>
+              <a:t>Touch location</a:t>
+            </a:r>
+          </a:p>
+          <a:p>
+            <a:pPr lvl="1"/>
+            <a:r>
+              <a:rPr kumimoji="1" lang="en-US" altLang="ko-KR" sz="1400" dirty="0" smtClean="0"/>
+              <a:t>Number of pointers (fingers)</a:t>
+            </a:r>
+          </a:p>
+          <a:p>
+            <a:pPr lvl="1"/>
+            <a:r>
+              <a:rPr kumimoji="1" lang="en-US" altLang="ko-KR" sz="1400" dirty="0" smtClean="0"/>
+              <a:t>Event time</a:t>
+            </a:r>
+          </a:p>
+          <a:p>
+            <a:r>
+              <a:rPr kumimoji="1" lang="en-US" altLang="ko-KR" sz="1800" dirty="0" smtClean="0"/>
+              <a:t>A ‘gesture’ is defined as beginning with ACTION_DOWN and ending with ACTION_UP</a:t>
+            </a:r>
+            <a:endParaRPr kumimoji="1" lang="ko-KR" altLang="en-US" sz="1800" dirty="0"/>
+          </a:p>
+        </p:txBody>
+      </p:sp>
+    </p:spTree>
+    <p:extLst>
+      <p:ext uri="{BB962C8B-B14F-4D97-AF65-F5344CB8AC3E}">
+        <p14:creationId xmlns:p14="http://schemas.microsoft.com/office/powerpoint/2010/main" val="643607196"/>
+      </p:ext>
+    </p:extLst>
+  </p:cSld>
+  <p:clrMapOvr>
+    <a:masterClrMapping/>
+  </p:clrMapOvr>
+</p:sld>
+</file>
+
+<file path=ppt/slides/slide3.xml><?xml version="1.0" encoding="utf-8"?>
+<p:sld xmlns:a="http://schemas.openxmlformats.org/drawingml/2006/main" xmlns:r="http://schemas.openxmlformats.org/officeDocument/2006/relationships" xmlns:p="http://schemas.openxmlformats.org/presentationml/2006/main">
+  <p:cSld>
+    <p:spTree>
+      <p:nvGrpSpPr>
+        <p:cNvPr id="1" name=""/>
+        <p:cNvGrpSpPr/>
+        <p:nvPr/>
+      </p:nvGrpSpPr>
+      <p:grpSpPr>
+        <a:xfrm>
+          <a:off x="0" y="0"/>
+          <a:ext cx="0" cy="0"/>
+          <a:chOff x="0" y="0"/>
+          <a:chExt cx="0" cy="0"/>
+        </a:xfrm>
+      </p:grpSpPr>
+      <p:sp>
+        <p:nvSpPr>
+          <p:cNvPr id="4" name="직사각형 3"/>
+          <p:cNvSpPr/>
+          <p:nvPr/>
+        </p:nvSpPr>
+        <p:spPr>
+          <a:xfrm>
+            <a:off x="194554" y="464133"/>
+            <a:ext cx="2120629" cy="2838152"/>
+          </a:xfrm>
+          <a:prstGeom prst="rect">
+            <a:avLst/>
+          </a:prstGeom>
+        </p:spPr>
+        <p:style>
+          <a:lnRef idx="2">
+            <a:schemeClr val="accent1">
+              <a:shade val="50000"/>
+            </a:schemeClr>
+          </a:lnRef>
+          <a:fillRef idx="1">
+            <a:schemeClr val="accent1"/>
+          </a:fillRef>
+          <a:effectRef idx="0">
+            <a:schemeClr val="accent1"/>
+          </a:effectRef>
+          <a:fontRef idx="minor">
+            <a:schemeClr val="lt1"/>
+          </a:fontRef>
+        </p:style>
+        <p:txBody>
+          <a:bodyPr rtlCol="0" anchor="ctr"/>
+          <a:lstStyle/>
+          <a:p>
+            <a:pPr algn="ctr"/>
+            <a:endParaRPr kumimoji="1" lang="ko-KR" altLang="en-US"/>
+          </a:p>
+        </p:txBody>
+      </p:sp>
+      <p:sp>
+        <p:nvSpPr>
+          <p:cNvPr id="5" name="텍스트 상자 4"/>
+          <p:cNvSpPr txBox="1"/>
+          <p:nvPr/>
+        </p:nvSpPr>
+        <p:spPr>
+          <a:xfrm>
+            <a:off x="126459" y="116731"/>
+            <a:ext cx="886781" cy="276999"/>
+          </a:xfrm>
+          <a:prstGeom prst="rect">
+            <a:avLst/>
+          </a:prstGeom>
+          <a:noFill/>
+        </p:spPr>
+        <p:txBody>
+          <a:bodyPr wrap="none" rtlCol="0">
+            <a:spAutoFit/>
+          </a:bodyPr>
+          <a:lstStyle/>
+          <a:p>
+            <a:r>
+              <a:rPr kumimoji="1" lang="en-US" altLang="ko-KR" sz="1200" b="1" dirty="0" err="1" smtClean="0">
+                <a:solidFill>
+                  <a:schemeClr val="accent1">
+                    <a:lumMod val="75000"/>
+                  </a:schemeClr>
+                </a:solidFill>
+              </a:rPr>
+              <a:t>decoView</a:t>
+            </a:r>
+            <a:endParaRPr kumimoji="1" lang="ko-KR" altLang="en-US" sz="1200" b="1" dirty="0">
+              <a:solidFill>
+                <a:schemeClr val="accent1">
+                  <a:lumMod val="75000"/>
+                </a:schemeClr>
+              </a:solidFill>
+            </a:endParaRPr>
+          </a:p>
+        </p:txBody>
+      </p:sp>
+      <p:sp>
+        <p:nvSpPr>
+          <p:cNvPr id="6" name="직사각형 5"/>
+          <p:cNvSpPr/>
+          <p:nvPr/>
+        </p:nvSpPr>
+        <p:spPr>
+          <a:xfrm>
+            <a:off x="330740" y="573932"/>
+            <a:ext cx="1808116" cy="424126"/>
+          </a:xfrm>
+          <a:prstGeom prst="rect">
+            <a:avLst/>
+          </a:prstGeom>
+          <a:solidFill>
+            <a:schemeClr val="accent4">
+              <a:lumMod val="20000"/>
+              <a:lumOff val="80000"/>
+            </a:schemeClr>
+          </a:solidFill>
+        </p:spPr>
+        <p:style>
+          <a:lnRef idx="2">
+            <a:schemeClr val="accent1">
+              <a:shade val="50000"/>
+            </a:schemeClr>
+          </a:lnRef>
+          <a:fillRef idx="1">
+            <a:schemeClr val="accent1"/>
+          </a:fillRef>
+          <a:effectRef idx="0">
+            <a:schemeClr val="accent1"/>
+          </a:effectRef>
+          <a:fontRef idx="minor">
+            <a:schemeClr val="lt1"/>
+          </a:fontRef>
+        </p:style>
+        <p:txBody>
+          <a:bodyPr rtlCol="0" anchor="ctr"/>
+          <a:lstStyle/>
+          <a:p>
+            <a:pPr algn="ctr"/>
+            <a:r>
+              <a:rPr kumimoji="1" lang="en-US" altLang="ko-KR" sz="1200" dirty="0" smtClean="0">
+                <a:solidFill>
+                  <a:schemeClr val="tx1"/>
+                </a:solidFill>
+              </a:rPr>
+              <a:t>Status bar</a:t>
+            </a:r>
+            <a:endParaRPr kumimoji="1" lang="ko-KR" altLang="en-US" sz="1200" dirty="0">
+              <a:solidFill>
+                <a:schemeClr val="tx1"/>
+              </a:solidFill>
+            </a:endParaRPr>
+          </a:p>
+        </p:txBody>
+      </p:sp>
+      <p:sp>
+        <p:nvSpPr>
+          <p:cNvPr id="7" name="직사각형 6"/>
+          <p:cNvSpPr/>
+          <p:nvPr/>
+        </p:nvSpPr>
+        <p:spPr>
+          <a:xfrm>
+            <a:off x="350195" y="2752927"/>
+            <a:ext cx="1763470" cy="412965"/>
+          </a:xfrm>
+          <a:prstGeom prst="rect">
+            <a:avLst/>
+          </a:prstGeom>
+          <a:solidFill>
+            <a:srgbClr val="00B134"/>
+          </a:solidFill>
+        </p:spPr>
+        <p:style>
+          <a:lnRef idx="2">
+            <a:schemeClr val="accent1">
+              <a:shade val="50000"/>
+            </a:schemeClr>
+          </a:lnRef>
+          <a:fillRef idx="1">
+            <a:schemeClr val="accent1"/>
+          </a:fillRef>
+          <a:effectRef idx="0">
+            <a:schemeClr val="accent1"/>
+          </a:effectRef>
+          <a:fontRef idx="minor">
+            <a:schemeClr val="lt1"/>
+          </a:fontRef>
+        </p:style>
+        <p:txBody>
+          <a:bodyPr rtlCol="0" anchor="ctr"/>
+          <a:lstStyle/>
+          <a:p>
+            <a:pPr algn="ctr"/>
+            <a:r>
+              <a:rPr kumimoji="1" lang="en-US" altLang="ko-KR" sz="1200" smtClean="0"/>
+              <a:t>Navigation</a:t>
+            </a:r>
+            <a:r>
+              <a:rPr kumimoji="1" lang="en-US" altLang="ko-KR" smtClean="0"/>
+              <a:t> </a:t>
+            </a:r>
+            <a:r>
+              <a:rPr kumimoji="1" lang="en-US" altLang="ko-KR" sz="1200" smtClean="0"/>
+              <a:t>bar</a:t>
+            </a:r>
+            <a:endParaRPr kumimoji="1" lang="ko-KR" altLang="en-US" sz="1200" dirty="0"/>
+          </a:p>
+        </p:txBody>
+      </p:sp>
+      <p:sp>
+        <p:nvSpPr>
+          <p:cNvPr id="8" name="직사각형 7"/>
+          <p:cNvSpPr/>
+          <p:nvPr/>
+        </p:nvSpPr>
+        <p:spPr>
+          <a:xfrm>
+            <a:off x="330740" y="1107857"/>
+            <a:ext cx="1837300" cy="1508677"/>
+          </a:xfrm>
+          <a:prstGeom prst="rect">
+            <a:avLst/>
+          </a:prstGeom>
+          <a:solidFill>
+            <a:srgbClr val="FFFF00"/>
+          </a:solidFill>
+        </p:spPr>
+        <p:style>
+          <a:lnRef idx="2">
+            <a:schemeClr val="accent1">
+              <a:shade val="50000"/>
+            </a:schemeClr>
+          </a:lnRef>
+          <a:fillRef idx="1">
+            <a:schemeClr val="accent1"/>
+          </a:fillRef>
+          <a:effectRef idx="0">
+            <a:schemeClr val="accent1"/>
+          </a:effectRef>
+          <a:fontRef idx="minor">
+            <a:schemeClr val="lt1"/>
+          </a:fontRef>
+        </p:style>
+        <p:txBody>
+          <a:bodyPr rtlCol="0" anchor="t" anchorCtr="0"/>
+          <a:lstStyle/>
+          <a:p>
+            <a:pPr algn="ctr"/>
+            <a:r>
+              <a:rPr kumimoji="1" lang="en-US" altLang="ko-KR" sz="1600" dirty="0" err="1" smtClean="0">
+                <a:solidFill>
+                  <a:schemeClr val="tx1"/>
+                </a:solidFill>
+              </a:rPr>
+              <a:t>ContentView</a:t>
+            </a:r>
+            <a:endParaRPr kumimoji="1" lang="ko-KR" altLang="en-US" sz="1600" dirty="0">
+              <a:solidFill>
+                <a:schemeClr val="tx1"/>
+              </a:solidFill>
+            </a:endParaRPr>
+          </a:p>
+        </p:txBody>
+      </p:sp>
+      <p:sp>
+        <p:nvSpPr>
+          <p:cNvPr id="9" name="직사각형 8"/>
+          <p:cNvSpPr/>
+          <p:nvPr/>
+        </p:nvSpPr>
+        <p:spPr>
+          <a:xfrm>
+            <a:off x="414806" y="2203211"/>
+            <a:ext cx="754901" cy="316801"/>
+          </a:xfrm>
+          <a:prstGeom prst="rect">
+            <a:avLst/>
+          </a:prstGeom>
+          <a:solidFill>
+            <a:srgbClr val="FF632B"/>
+          </a:solidFill>
+        </p:spPr>
+        <p:style>
+          <a:lnRef idx="2">
+            <a:schemeClr val="accent1">
+              <a:shade val="50000"/>
+            </a:schemeClr>
+          </a:lnRef>
+          <a:fillRef idx="1">
+            <a:schemeClr val="accent1"/>
+          </a:fillRef>
+          <a:effectRef idx="0">
+            <a:schemeClr val="accent1"/>
+          </a:effectRef>
+          <a:fontRef idx="minor">
+            <a:schemeClr val="lt1"/>
+          </a:fontRef>
+        </p:style>
+        <p:txBody>
+          <a:bodyPr rtlCol="0" anchor="ctr"/>
+          <a:lstStyle/>
+          <a:p>
+            <a:pPr algn="ctr"/>
+            <a:r>
+              <a:rPr kumimoji="1" lang="en-US" altLang="ko-KR" sz="1200" dirty="0" smtClean="0"/>
+              <a:t>Button1</a:t>
+            </a:r>
+            <a:endParaRPr kumimoji="1" lang="ko-KR" altLang="en-US" sz="1200" dirty="0"/>
+          </a:p>
+        </p:txBody>
+      </p:sp>
+      <p:sp>
+        <p:nvSpPr>
+          <p:cNvPr id="10" name="직사각형 9"/>
+          <p:cNvSpPr/>
+          <p:nvPr/>
+        </p:nvSpPr>
+        <p:spPr>
+          <a:xfrm>
+            <a:off x="1283197" y="2210181"/>
+            <a:ext cx="754901" cy="314043"/>
+          </a:xfrm>
+          <a:prstGeom prst="rect">
+            <a:avLst/>
+          </a:prstGeom>
+          <a:solidFill>
+            <a:srgbClr val="FF632B"/>
+          </a:solidFill>
+        </p:spPr>
+        <p:style>
+          <a:lnRef idx="2">
+            <a:schemeClr val="accent1">
+              <a:shade val="50000"/>
+            </a:schemeClr>
+          </a:lnRef>
+          <a:fillRef idx="1">
+            <a:schemeClr val="accent1"/>
+          </a:fillRef>
+          <a:effectRef idx="0">
+            <a:schemeClr val="accent1"/>
+          </a:effectRef>
+          <a:fontRef idx="minor">
+            <a:schemeClr val="lt1"/>
+          </a:fontRef>
+        </p:style>
+        <p:txBody>
+          <a:bodyPr rtlCol="0" anchor="ctr"/>
+          <a:lstStyle/>
+          <a:p>
+            <a:pPr algn="ctr"/>
+            <a:r>
+              <a:rPr kumimoji="1" lang="en-US" altLang="ko-KR" sz="1200" dirty="0" smtClean="0"/>
+              <a:t>Button2</a:t>
+            </a:r>
+            <a:endParaRPr kumimoji="1" lang="ko-KR" altLang="en-US" sz="1200" dirty="0"/>
+          </a:p>
+        </p:txBody>
+      </p:sp>
+      <p:cxnSp>
+        <p:nvCxnSpPr>
+          <p:cNvPr id="12" name="직선 연결선[R] 11"/>
+          <p:cNvCxnSpPr/>
+          <p:nvPr/>
+        </p:nvCxnSpPr>
+        <p:spPr>
+          <a:xfrm>
+            <a:off x="0" y="3433864"/>
+            <a:ext cx="12192000" cy="0"/>
+          </a:xfrm>
+          <a:prstGeom prst="line">
+            <a:avLst/>
+          </a:prstGeom>
+          <a:ln w="38100"/>
+        </p:spPr>
+        <p:style>
+          <a:lnRef idx="1">
+            <a:schemeClr val="accent1"/>
+          </a:lnRef>
+          <a:fillRef idx="0">
+            <a:schemeClr val="accent1"/>
+          </a:fillRef>
+          <a:effectRef idx="0">
+            <a:schemeClr val="accent1"/>
+          </a:effectRef>
+          <a:fontRef idx="minor">
+            <a:schemeClr val="tx1"/>
+          </a:fontRef>
+        </p:style>
+      </p:cxnSp>
+      <p:cxnSp>
+        <p:nvCxnSpPr>
+          <p:cNvPr id="15" name="직선 연결선[R] 14"/>
+          <p:cNvCxnSpPr/>
+          <p:nvPr/>
+        </p:nvCxnSpPr>
+        <p:spPr>
+          <a:xfrm>
+            <a:off x="3939702" y="0"/>
+            <a:ext cx="0" cy="3443591"/>
+          </a:xfrm>
+          <a:prstGeom prst="line">
+            <a:avLst/>
+          </a:prstGeom>
+          <a:ln w="38100">
+            <a:solidFill>
+              <a:schemeClr val="accent1"/>
+            </a:solidFill>
+          </a:ln>
+        </p:spPr>
+        <p:style>
+          <a:lnRef idx="1">
+            <a:schemeClr val="accent1"/>
+          </a:lnRef>
+          <a:fillRef idx="0">
+            <a:schemeClr val="accent1"/>
+          </a:fillRef>
+          <a:effectRef idx="0">
+            <a:schemeClr val="accent1"/>
+          </a:effectRef>
+          <a:fontRef idx="minor">
+            <a:schemeClr val="tx1"/>
+          </a:fontRef>
+        </p:style>
+      </p:cxnSp>
+      <p:sp>
+        <p:nvSpPr>
+          <p:cNvPr id="16" name="텍스트 상자 15"/>
+          <p:cNvSpPr txBox="1"/>
+          <p:nvPr/>
+        </p:nvSpPr>
+        <p:spPr>
+          <a:xfrm>
+            <a:off x="2481879" y="2545303"/>
+            <a:ext cx="1310680" cy="307777"/>
+          </a:xfrm>
+          <a:prstGeom prst="rect">
+            <a:avLst/>
+          </a:prstGeom>
+          <a:noFill/>
+        </p:spPr>
+        <p:txBody>
+          <a:bodyPr wrap="none" rtlCol="0">
+            <a:spAutoFit/>
+          </a:bodyPr>
+          <a:lstStyle/>
+          <a:p>
+            <a:r>
+              <a:rPr kumimoji="1" lang="en-US" altLang="ko-KR" sz="1400" dirty="0" smtClean="0"/>
+              <a:t>What you see</a:t>
+            </a:r>
+            <a:endParaRPr kumimoji="1" lang="ko-KR" altLang="en-US" sz="1400" dirty="0"/>
+          </a:p>
+        </p:txBody>
+      </p:sp>
+      <p:sp>
+        <p:nvSpPr>
+          <p:cNvPr id="17" name="텍스트 상자 16"/>
+          <p:cNvSpPr txBox="1"/>
+          <p:nvPr/>
+        </p:nvSpPr>
+        <p:spPr>
+          <a:xfrm>
+            <a:off x="3985175" y="2501003"/>
+            <a:ext cx="1458156" cy="738664"/>
+          </a:xfrm>
+          <a:prstGeom prst="rect">
+            <a:avLst/>
+          </a:prstGeom>
+          <a:noFill/>
+        </p:spPr>
+        <p:txBody>
+          <a:bodyPr wrap="none" rtlCol="0">
+            <a:spAutoFit/>
+          </a:bodyPr>
+          <a:lstStyle/>
+          <a:p>
+            <a:r>
+              <a:rPr kumimoji="1" lang="en-US" altLang="ko-KR" sz="1400" dirty="0" smtClean="0"/>
+              <a:t>How they are</a:t>
+            </a:r>
+            <a:br>
+              <a:rPr kumimoji="1" lang="en-US" altLang="ko-KR" sz="1400" dirty="0" smtClean="0"/>
+            </a:br>
+            <a:r>
+              <a:rPr kumimoji="1" lang="en-US" altLang="ko-KR" sz="1400" dirty="0" smtClean="0"/>
+              <a:t>represented</a:t>
+            </a:r>
+            <a:br>
+              <a:rPr kumimoji="1" lang="en-US" altLang="ko-KR" sz="1400" dirty="0" smtClean="0"/>
+            </a:br>
+            <a:r>
+              <a:rPr kumimoji="1" lang="en-US" altLang="ko-KR" sz="1400" dirty="0" smtClean="0"/>
+              <a:t>(view hierarchy)</a:t>
+            </a:r>
+            <a:endParaRPr kumimoji="1" lang="ko-KR" altLang="en-US" sz="1400" dirty="0"/>
+          </a:p>
+        </p:txBody>
+      </p:sp>
+      <p:sp>
+        <p:nvSpPr>
+          <p:cNvPr id="18" name="모서리가 둥근 직사각형 17"/>
+          <p:cNvSpPr/>
+          <p:nvPr/>
+        </p:nvSpPr>
+        <p:spPr>
+          <a:xfrm>
+            <a:off x="7130375" y="190604"/>
+            <a:ext cx="1498060" cy="406251"/>
+          </a:xfrm>
+          <a:prstGeom prst="roundRect">
+            <a:avLst/>
+          </a:prstGeom>
+        </p:spPr>
+        <p:style>
+          <a:lnRef idx="2">
+            <a:schemeClr val="accent1">
+              <a:shade val="50000"/>
+            </a:schemeClr>
+          </a:lnRef>
+          <a:fillRef idx="1">
+            <a:schemeClr val="accent1"/>
+          </a:fillRef>
+          <a:effectRef idx="0">
+            <a:schemeClr val="accent1"/>
+          </a:effectRef>
+          <a:fontRef idx="minor">
+            <a:schemeClr val="lt1"/>
+          </a:fontRef>
+        </p:style>
+        <p:txBody>
+          <a:bodyPr rtlCol="0" anchor="ctr"/>
+          <a:lstStyle/>
+          <a:p>
+            <a:pPr algn="ctr"/>
+            <a:r>
+              <a:rPr kumimoji="1" lang="en-US" altLang="ko-KR" dirty="0" err="1" smtClean="0"/>
+              <a:t>decoView</a:t>
+            </a:r>
+            <a:endParaRPr kumimoji="1" lang="ko-KR" altLang="en-US" dirty="0"/>
+          </a:p>
+        </p:txBody>
+      </p:sp>
+      <p:sp>
+        <p:nvSpPr>
+          <p:cNvPr id="19" name="텍스트 상자 18"/>
+          <p:cNvSpPr txBox="1"/>
+          <p:nvPr/>
+        </p:nvSpPr>
+        <p:spPr>
+          <a:xfrm>
+            <a:off x="9202366" y="255229"/>
+            <a:ext cx="929485" cy="276999"/>
+          </a:xfrm>
+          <a:prstGeom prst="rect">
+            <a:avLst/>
+          </a:prstGeom>
+          <a:noFill/>
+        </p:spPr>
+        <p:txBody>
+          <a:bodyPr wrap="none" rtlCol="0">
+            <a:spAutoFit/>
+          </a:bodyPr>
+          <a:lstStyle/>
+          <a:p>
+            <a:r>
+              <a:rPr kumimoji="1" lang="en-US" altLang="ko-KR" sz="1200" dirty="0" err="1" smtClean="0"/>
+              <a:t>viewGroup</a:t>
+            </a:r>
+            <a:endParaRPr kumimoji="1" lang="ko-KR" altLang="en-US" sz="1200" dirty="0"/>
+          </a:p>
+        </p:txBody>
+      </p:sp>
+      <p:sp>
+        <p:nvSpPr>
+          <p:cNvPr id="20" name="모서리가 둥근 직사각형 19"/>
+          <p:cNvSpPr/>
+          <p:nvPr/>
+        </p:nvSpPr>
+        <p:spPr>
+          <a:xfrm>
+            <a:off x="4250987" y="904672"/>
+            <a:ext cx="1001949" cy="496111"/>
+          </a:xfrm>
+          <a:prstGeom prst="roundRect">
+            <a:avLst/>
+          </a:prstGeom>
+          <a:solidFill>
+            <a:schemeClr val="accent4">
+              <a:lumMod val="20000"/>
+              <a:lumOff val="80000"/>
+            </a:schemeClr>
+          </a:solidFill>
+        </p:spPr>
+        <p:style>
+          <a:lnRef idx="2">
+            <a:schemeClr val="accent1">
+              <a:shade val="50000"/>
+            </a:schemeClr>
+          </a:lnRef>
+          <a:fillRef idx="1">
+            <a:schemeClr val="accent1"/>
+          </a:fillRef>
+          <a:effectRef idx="0">
+            <a:schemeClr val="accent1"/>
+          </a:effectRef>
+          <a:fontRef idx="minor">
+            <a:schemeClr val="lt1"/>
+          </a:fontRef>
+        </p:style>
+        <p:txBody>
+          <a:bodyPr rtlCol="0" anchor="ctr"/>
+          <a:lstStyle/>
+          <a:p>
+            <a:pPr algn="ctr"/>
+            <a:r>
+              <a:rPr kumimoji="1" lang="en-US" altLang="ko-KR" sz="1200" dirty="0" smtClean="0">
+                <a:solidFill>
+                  <a:schemeClr val="tx1"/>
+                </a:solidFill>
+              </a:rPr>
+              <a:t>Status bar</a:t>
+            </a:r>
+            <a:endParaRPr kumimoji="1" lang="ko-KR" altLang="en-US" sz="1200" dirty="0">
+              <a:solidFill>
+                <a:schemeClr val="tx1"/>
+              </a:solidFill>
+            </a:endParaRPr>
+          </a:p>
+        </p:txBody>
+      </p:sp>
+      <p:sp>
+        <p:nvSpPr>
+          <p:cNvPr id="21" name="모서리가 둥근 직사각형 20"/>
+          <p:cNvSpPr/>
+          <p:nvPr/>
+        </p:nvSpPr>
+        <p:spPr>
+          <a:xfrm>
+            <a:off x="5610578" y="904672"/>
+            <a:ext cx="1433689" cy="496111"/>
+          </a:xfrm>
+          <a:prstGeom prst="roundRect">
+            <a:avLst/>
+          </a:prstGeom>
+          <a:solidFill>
+            <a:srgbClr val="00B134"/>
+          </a:solidFill>
+        </p:spPr>
+        <p:style>
+          <a:lnRef idx="2">
+            <a:schemeClr val="accent1">
+              <a:shade val="50000"/>
+            </a:schemeClr>
+          </a:lnRef>
+          <a:fillRef idx="1">
+            <a:schemeClr val="accent1"/>
+          </a:fillRef>
+          <a:effectRef idx="0">
+            <a:schemeClr val="accent1"/>
+          </a:effectRef>
+          <a:fontRef idx="minor">
+            <a:schemeClr val="lt1"/>
+          </a:fontRef>
+        </p:style>
+        <p:txBody>
+          <a:bodyPr rtlCol="0" anchor="ctr"/>
+          <a:lstStyle/>
+          <a:p>
+            <a:pPr algn="ctr"/>
+            <a:r>
+              <a:rPr kumimoji="1" lang="en-US" altLang="ko-KR" sz="1200" dirty="0" smtClean="0"/>
+              <a:t>Navigation bar</a:t>
+            </a:r>
+            <a:endParaRPr kumimoji="1" lang="ko-KR" altLang="en-US" sz="1200" dirty="0"/>
+          </a:p>
+        </p:txBody>
+      </p:sp>
+      <p:sp>
+        <p:nvSpPr>
+          <p:cNvPr id="22" name="모서리가 둥근 직사각형 21"/>
+          <p:cNvSpPr/>
+          <p:nvPr/>
+        </p:nvSpPr>
+        <p:spPr>
+          <a:xfrm>
+            <a:off x="7473244" y="904672"/>
+            <a:ext cx="2054578" cy="496111"/>
+          </a:xfrm>
+          <a:prstGeom prst="roundRect">
+            <a:avLst/>
+          </a:prstGeom>
+          <a:solidFill>
+            <a:srgbClr val="FFFF00"/>
+          </a:solidFill>
+        </p:spPr>
+        <p:style>
+          <a:lnRef idx="2">
+            <a:schemeClr val="accent1">
+              <a:shade val="50000"/>
+            </a:schemeClr>
+          </a:lnRef>
+          <a:fillRef idx="1">
+            <a:schemeClr val="accent1"/>
+          </a:fillRef>
+          <a:effectRef idx="0">
+            <a:schemeClr val="accent1"/>
+          </a:effectRef>
+          <a:fontRef idx="minor">
+            <a:schemeClr val="lt1"/>
+          </a:fontRef>
+        </p:style>
+        <p:txBody>
+          <a:bodyPr rtlCol="0" anchor="ctr"/>
+          <a:lstStyle/>
+          <a:p>
+            <a:pPr algn="ctr"/>
+            <a:r>
+              <a:rPr kumimoji="1" lang="en-US" altLang="ko-KR" dirty="0" err="1" smtClean="0">
+                <a:solidFill>
+                  <a:schemeClr val="tx1"/>
+                </a:solidFill>
+              </a:rPr>
+              <a:t>ContentView</a:t>
+            </a:r>
+            <a:endParaRPr kumimoji="1" lang="ko-KR" altLang="en-US" dirty="0">
+              <a:solidFill>
+                <a:schemeClr val="tx1"/>
+              </a:solidFill>
+            </a:endParaRPr>
+          </a:p>
+        </p:txBody>
+      </p:sp>
+      <p:sp>
+        <p:nvSpPr>
+          <p:cNvPr id="23" name="모서리가 둥근 직사각형 22"/>
+          <p:cNvSpPr/>
+          <p:nvPr/>
+        </p:nvSpPr>
+        <p:spPr>
+          <a:xfrm>
+            <a:off x="7473244" y="1721795"/>
+            <a:ext cx="2054578" cy="488386"/>
+          </a:xfrm>
+          <a:prstGeom prst="roundRect">
+            <a:avLst/>
+          </a:prstGeom>
+          <a:solidFill>
+            <a:srgbClr val="FF8DF7"/>
+          </a:solidFill>
+        </p:spPr>
+        <p:style>
+          <a:lnRef idx="2">
+            <a:schemeClr val="accent1">
+              <a:shade val="50000"/>
+            </a:schemeClr>
+          </a:lnRef>
+          <a:fillRef idx="1">
+            <a:schemeClr val="accent1"/>
+          </a:fillRef>
+          <a:effectRef idx="0">
+            <a:schemeClr val="accent1"/>
+          </a:effectRef>
+          <a:fontRef idx="minor">
+            <a:schemeClr val="lt1"/>
+          </a:fontRef>
+        </p:style>
+        <p:txBody>
+          <a:bodyPr rtlCol="0" anchor="ctr"/>
+          <a:lstStyle/>
+          <a:p>
+            <a:pPr algn="ctr"/>
+            <a:r>
+              <a:rPr kumimoji="1" lang="en-US" altLang="ko-KR" dirty="0" smtClean="0"/>
+              <a:t>Layout</a:t>
+            </a:r>
+            <a:endParaRPr kumimoji="1" lang="ko-KR" altLang="en-US" dirty="0"/>
+          </a:p>
+        </p:txBody>
+      </p:sp>
+      <p:sp>
+        <p:nvSpPr>
+          <p:cNvPr id="24" name="직사각형 23"/>
+          <p:cNvSpPr/>
+          <p:nvPr/>
+        </p:nvSpPr>
+        <p:spPr>
+          <a:xfrm>
+            <a:off x="7473244" y="2528813"/>
+            <a:ext cx="754901" cy="316801"/>
+          </a:xfrm>
+          <a:prstGeom prst="rect">
+            <a:avLst/>
+          </a:prstGeom>
+          <a:solidFill>
+            <a:srgbClr val="FF632B"/>
+          </a:solidFill>
+        </p:spPr>
+        <p:style>
+          <a:lnRef idx="2">
+            <a:schemeClr val="accent1">
+              <a:shade val="50000"/>
+            </a:schemeClr>
+          </a:lnRef>
+          <a:fillRef idx="1">
+            <a:schemeClr val="accent1"/>
+          </a:fillRef>
+          <a:effectRef idx="0">
+            <a:schemeClr val="accent1"/>
+          </a:effectRef>
+          <a:fontRef idx="minor">
+            <a:schemeClr val="lt1"/>
+          </a:fontRef>
+        </p:style>
+        <p:txBody>
+          <a:bodyPr rtlCol="0" anchor="ctr"/>
+          <a:lstStyle/>
+          <a:p>
+            <a:pPr algn="ctr"/>
+            <a:r>
+              <a:rPr kumimoji="1" lang="en-US" altLang="ko-KR" sz="1200" dirty="0" smtClean="0"/>
+              <a:t>Button1</a:t>
+            </a:r>
+            <a:endParaRPr kumimoji="1" lang="ko-KR" altLang="en-US" sz="1200" dirty="0"/>
+          </a:p>
+        </p:txBody>
+      </p:sp>
+      <p:sp>
+        <p:nvSpPr>
+          <p:cNvPr id="25" name="직사각형 24"/>
+          <p:cNvSpPr/>
+          <p:nvPr/>
+        </p:nvSpPr>
+        <p:spPr>
+          <a:xfrm>
+            <a:off x="8772921" y="2531571"/>
+            <a:ext cx="754901" cy="314043"/>
+          </a:xfrm>
+          <a:prstGeom prst="rect">
+            <a:avLst/>
+          </a:prstGeom>
+          <a:solidFill>
+            <a:srgbClr val="FF632B"/>
+          </a:solidFill>
+        </p:spPr>
+        <p:style>
+          <a:lnRef idx="2">
+            <a:schemeClr val="accent1">
+              <a:shade val="50000"/>
+            </a:schemeClr>
+          </a:lnRef>
+          <a:fillRef idx="1">
+            <a:schemeClr val="accent1"/>
+          </a:fillRef>
+          <a:effectRef idx="0">
+            <a:schemeClr val="accent1"/>
+          </a:effectRef>
+          <a:fontRef idx="minor">
+            <a:schemeClr val="lt1"/>
+          </a:fontRef>
+        </p:style>
+        <p:txBody>
+          <a:bodyPr rtlCol="0" anchor="ctr"/>
+          <a:lstStyle/>
+          <a:p>
+            <a:pPr algn="ctr"/>
+            <a:r>
+              <a:rPr kumimoji="1" lang="en-US" altLang="ko-KR" sz="1200" dirty="0" smtClean="0"/>
+              <a:t>Button2</a:t>
+            </a:r>
+            <a:endParaRPr kumimoji="1" lang="ko-KR" altLang="en-US" sz="1200" dirty="0"/>
+          </a:p>
+        </p:txBody>
+      </p:sp>
+      <p:sp>
+        <p:nvSpPr>
+          <p:cNvPr id="26" name="텍스트 상자 25"/>
+          <p:cNvSpPr txBox="1"/>
+          <p:nvPr/>
+        </p:nvSpPr>
+        <p:spPr>
+          <a:xfrm>
+            <a:off x="9795033" y="974097"/>
+            <a:ext cx="1227644" cy="276999"/>
+          </a:xfrm>
+          <a:prstGeom prst="rect">
+            <a:avLst/>
+          </a:prstGeom>
+          <a:noFill/>
+        </p:spPr>
+        <p:txBody>
+          <a:bodyPr wrap="none" rtlCol="0">
+            <a:spAutoFit/>
+          </a:bodyPr>
+          <a:lstStyle/>
+          <a:p>
+            <a:r>
+              <a:rPr kumimoji="1" lang="en-US" altLang="ko-KR" sz="1200" dirty="0" err="1" smtClean="0"/>
+              <a:t>viewGroup</a:t>
+            </a:r>
+            <a:r>
+              <a:rPr kumimoji="1" lang="en-US" altLang="ko-KR" sz="1200" dirty="0" smtClean="0"/>
+              <a:t> (</a:t>
+            </a:r>
+            <a:r>
+              <a:rPr kumimoji="1" lang="en-US" altLang="ko-KR" sz="1200" dirty="0" smtClean="0">
+                <a:solidFill>
+                  <a:srgbClr val="0070C0"/>
+                </a:solidFill>
+              </a:rPr>
+              <a:t>1*</a:t>
+            </a:r>
+            <a:r>
+              <a:rPr kumimoji="1" lang="en-US" altLang="ko-KR" sz="1200" dirty="0" smtClean="0"/>
+              <a:t>)</a:t>
+            </a:r>
+            <a:endParaRPr kumimoji="1" lang="ko-KR" altLang="en-US" sz="1200" dirty="0"/>
+          </a:p>
+        </p:txBody>
+      </p:sp>
+      <p:sp>
+        <p:nvSpPr>
+          <p:cNvPr id="27" name="텍스트 상자 26"/>
+          <p:cNvSpPr txBox="1"/>
+          <p:nvPr/>
+        </p:nvSpPr>
+        <p:spPr>
+          <a:xfrm>
+            <a:off x="9795033" y="1776558"/>
+            <a:ext cx="1227644" cy="276999"/>
+          </a:xfrm>
+          <a:prstGeom prst="rect">
+            <a:avLst/>
+          </a:prstGeom>
+          <a:noFill/>
+        </p:spPr>
+        <p:txBody>
+          <a:bodyPr wrap="none" rtlCol="0">
+            <a:spAutoFit/>
+          </a:bodyPr>
+          <a:lstStyle/>
+          <a:p>
+            <a:r>
+              <a:rPr kumimoji="1" lang="en-US" altLang="ko-KR" sz="1200" dirty="0" err="1" smtClean="0"/>
+              <a:t>viewGroup</a:t>
+            </a:r>
+            <a:r>
+              <a:rPr kumimoji="1" lang="en-US" altLang="ko-KR" sz="1200" dirty="0" smtClean="0"/>
+              <a:t> (</a:t>
+            </a:r>
+            <a:r>
+              <a:rPr kumimoji="1" lang="en-US" altLang="ko-KR" sz="1200" dirty="0" smtClean="0">
+                <a:solidFill>
+                  <a:srgbClr val="0070C0"/>
+                </a:solidFill>
+              </a:rPr>
+              <a:t>2*</a:t>
+            </a:r>
+            <a:r>
+              <a:rPr kumimoji="1" lang="en-US" altLang="ko-KR" sz="1200" dirty="0" smtClean="0"/>
+              <a:t>)</a:t>
+            </a:r>
+            <a:endParaRPr kumimoji="1" lang="ko-KR" altLang="en-US" sz="1200" dirty="0"/>
+          </a:p>
+        </p:txBody>
+      </p:sp>
+      <p:sp>
+        <p:nvSpPr>
+          <p:cNvPr id="28" name="텍스트 상자 27"/>
+          <p:cNvSpPr txBox="1"/>
+          <p:nvPr/>
+        </p:nvSpPr>
+        <p:spPr>
+          <a:xfrm>
+            <a:off x="9795033" y="2845614"/>
+            <a:ext cx="2355581" cy="461665"/>
+          </a:xfrm>
+          <a:prstGeom prst="rect">
+            <a:avLst/>
+          </a:prstGeom>
+          <a:noFill/>
+        </p:spPr>
+        <p:txBody>
+          <a:bodyPr wrap="none" rtlCol="0">
+            <a:spAutoFit/>
+          </a:bodyPr>
+          <a:lstStyle/>
+          <a:p>
+            <a:r>
+              <a:rPr kumimoji="1" lang="en-US" altLang="ko-KR" sz="1200" dirty="0" smtClean="0">
+                <a:solidFill>
+                  <a:srgbClr val="0070C0"/>
+                </a:solidFill>
+              </a:rPr>
+              <a:t>1*  </a:t>
+            </a:r>
+            <a:r>
+              <a:rPr kumimoji="1" lang="en-US" altLang="ko-KR" sz="1200" dirty="0" err="1" smtClean="0">
+                <a:solidFill>
+                  <a:srgbClr val="0070C0"/>
+                </a:solidFill>
+              </a:rPr>
+              <a:t>framelayout</a:t>
+            </a:r>
+            <a:r>
+              <a:rPr kumimoji="1" lang="en-US" altLang="ko-KR" sz="1200" dirty="0" smtClean="0">
+                <a:solidFill>
+                  <a:srgbClr val="0070C0"/>
+                </a:solidFill>
+              </a:rPr>
+              <a:t/>
+            </a:r>
+            <a:br>
+              <a:rPr kumimoji="1" lang="en-US" altLang="ko-KR" sz="1200" dirty="0" smtClean="0">
+                <a:solidFill>
+                  <a:srgbClr val="0070C0"/>
+                </a:solidFill>
+              </a:rPr>
+            </a:br>
+            <a:r>
+              <a:rPr kumimoji="1" lang="en-US" altLang="ko-KR" sz="1200" dirty="0" smtClean="0">
+                <a:solidFill>
+                  <a:srgbClr val="0070C0"/>
+                </a:solidFill>
+              </a:rPr>
+              <a:t>2*  your application top layout</a:t>
+            </a:r>
+            <a:endParaRPr kumimoji="1" lang="ko-KR" altLang="en-US" sz="1200" dirty="0">
+              <a:solidFill>
+                <a:srgbClr val="0070C0"/>
+              </a:solidFill>
+            </a:endParaRPr>
+          </a:p>
+        </p:txBody>
+      </p:sp>
+      <p:sp>
+        <p:nvSpPr>
+          <p:cNvPr id="29" name="텍스트 상자 28"/>
+          <p:cNvSpPr txBox="1"/>
+          <p:nvPr/>
+        </p:nvSpPr>
+        <p:spPr>
+          <a:xfrm>
+            <a:off x="9802599" y="2466711"/>
+            <a:ext cx="494046" cy="276999"/>
+          </a:xfrm>
+          <a:prstGeom prst="rect">
+            <a:avLst/>
+          </a:prstGeom>
+          <a:noFill/>
+        </p:spPr>
+        <p:txBody>
+          <a:bodyPr wrap="none" rtlCol="0">
+            <a:spAutoFit/>
+          </a:bodyPr>
+          <a:lstStyle/>
+          <a:p>
+            <a:r>
+              <a:rPr kumimoji="1" lang="en-US" altLang="ko-KR" sz="1200" smtClean="0"/>
+              <a:t>view</a:t>
+            </a:r>
+            <a:endParaRPr kumimoji="1" lang="ko-KR" altLang="en-US" sz="1200" dirty="0"/>
+          </a:p>
+        </p:txBody>
+      </p:sp>
+      <p:sp>
+        <p:nvSpPr>
+          <p:cNvPr id="42" name="텍스트 상자 41"/>
+          <p:cNvSpPr txBox="1"/>
+          <p:nvPr/>
+        </p:nvSpPr>
+        <p:spPr>
+          <a:xfrm>
+            <a:off x="194805" y="3512982"/>
+            <a:ext cx="2111988" cy="307777"/>
+          </a:xfrm>
+          <a:prstGeom prst="rect">
+            <a:avLst/>
+          </a:prstGeom>
+          <a:noFill/>
+        </p:spPr>
+        <p:txBody>
+          <a:bodyPr wrap="none" rtlCol="0">
+            <a:spAutoFit/>
+          </a:bodyPr>
+          <a:lstStyle/>
+          <a:p>
+            <a:r>
+              <a:rPr kumimoji="1" lang="en-US" altLang="ko-KR" sz="1400" dirty="0"/>
+              <a:t>e</a:t>
+            </a:r>
+            <a:r>
+              <a:rPr kumimoji="1" lang="en-US" altLang="ko-KR" sz="1400" dirty="0" smtClean="0"/>
+              <a:t>vent handling pipeline</a:t>
+            </a:r>
+            <a:endParaRPr kumimoji="1" lang="ko-KR" altLang="en-US" sz="1400" dirty="0"/>
+          </a:p>
+        </p:txBody>
+      </p:sp>
+      <p:sp>
+        <p:nvSpPr>
+          <p:cNvPr id="43" name="모서리가 둥근 직사각형 42"/>
+          <p:cNvSpPr/>
+          <p:nvPr/>
+        </p:nvSpPr>
+        <p:spPr>
+          <a:xfrm>
+            <a:off x="9013908" y="4458573"/>
+            <a:ext cx="1306399" cy="511531"/>
+          </a:xfrm>
+          <a:prstGeom prst="roundRect">
+            <a:avLst/>
+          </a:prstGeom>
+        </p:spPr>
+        <p:style>
+          <a:lnRef idx="2">
+            <a:schemeClr val="accent1">
+              <a:shade val="50000"/>
+            </a:schemeClr>
+          </a:lnRef>
+          <a:fillRef idx="1">
+            <a:schemeClr val="accent1"/>
+          </a:fillRef>
+          <a:effectRef idx="0">
+            <a:schemeClr val="accent1"/>
+          </a:effectRef>
+          <a:fontRef idx="minor">
+            <a:schemeClr val="lt1"/>
+          </a:fontRef>
+        </p:style>
+        <p:txBody>
+          <a:bodyPr rtlCol="0" anchor="ctr"/>
+          <a:lstStyle/>
+          <a:p>
+            <a:pPr algn="ctr"/>
+            <a:r>
+              <a:rPr kumimoji="1" lang="en-US" altLang="ko-KR" sz="1200" dirty="0" smtClean="0"/>
+              <a:t>Input Manager Service</a:t>
+            </a:r>
+            <a:endParaRPr kumimoji="1" lang="ko-KR" altLang="en-US" sz="1200" dirty="0"/>
+          </a:p>
+        </p:txBody>
+      </p:sp>
+      <p:sp>
+        <p:nvSpPr>
+          <p:cNvPr id="44" name="모서리가 둥근 직사각형 43"/>
+          <p:cNvSpPr/>
+          <p:nvPr/>
+        </p:nvSpPr>
+        <p:spPr>
+          <a:xfrm>
+            <a:off x="7044267" y="3597360"/>
+            <a:ext cx="1306399" cy="511531"/>
+          </a:xfrm>
+          <a:prstGeom prst="roundRect">
+            <a:avLst/>
+          </a:prstGeom>
+        </p:spPr>
+        <p:style>
+          <a:lnRef idx="2">
+            <a:schemeClr val="accent1">
+              <a:shade val="50000"/>
+            </a:schemeClr>
+          </a:lnRef>
+          <a:fillRef idx="1">
+            <a:schemeClr val="accent1"/>
+          </a:fillRef>
+          <a:effectRef idx="0">
+            <a:schemeClr val="accent1"/>
+          </a:effectRef>
+          <a:fontRef idx="minor">
+            <a:schemeClr val="lt1"/>
+          </a:fontRef>
+        </p:style>
+        <p:txBody>
+          <a:bodyPr rtlCol="0" anchor="ctr"/>
+          <a:lstStyle/>
+          <a:p>
+            <a:pPr algn="ctr"/>
+            <a:r>
+              <a:rPr kumimoji="1" lang="en-US" altLang="ko-KR" sz="1200" dirty="0" smtClean="0"/>
+              <a:t>window</a:t>
+            </a:r>
+            <a:endParaRPr kumimoji="1" lang="ko-KR" altLang="en-US" sz="1200" dirty="0"/>
+          </a:p>
+        </p:txBody>
+      </p:sp>
+      <p:sp>
+        <p:nvSpPr>
+          <p:cNvPr id="45" name="모서리가 둥근 직사각형 44"/>
+          <p:cNvSpPr/>
+          <p:nvPr/>
+        </p:nvSpPr>
+        <p:spPr>
+          <a:xfrm>
+            <a:off x="7044266" y="4458573"/>
+            <a:ext cx="1306399" cy="511531"/>
+          </a:xfrm>
+          <a:prstGeom prst="roundRect">
+            <a:avLst/>
+          </a:prstGeom>
+        </p:spPr>
+        <p:style>
+          <a:lnRef idx="2">
+            <a:schemeClr val="accent1">
+              <a:shade val="50000"/>
+            </a:schemeClr>
+          </a:lnRef>
+          <a:fillRef idx="1">
+            <a:schemeClr val="accent1"/>
+          </a:fillRef>
+          <a:effectRef idx="0">
+            <a:schemeClr val="accent1"/>
+          </a:effectRef>
+          <a:fontRef idx="minor">
+            <a:schemeClr val="lt1"/>
+          </a:fontRef>
+        </p:style>
+        <p:txBody>
+          <a:bodyPr rtlCol="0" anchor="ctr"/>
+          <a:lstStyle/>
+          <a:p>
+            <a:pPr algn="ctr"/>
+            <a:r>
+              <a:rPr kumimoji="1" lang="en-US" altLang="ko-KR" sz="1200" smtClean="0"/>
+              <a:t>Activity</a:t>
+            </a:r>
+          </a:p>
+        </p:txBody>
+      </p:sp>
+      <p:sp>
+        <p:nvSpPr>
+          <p:cNvPr id="46" name="모서리가 둥근 직사각형 45"/>
+          <p:cNvSpPr/>
+          <p:nvPr/>
+        </p:nvSpPr>
+        <p:spPr>
+          <a:xfrm>
+            <a:off x="5009284" y="4465099"/>
+            <a:ext cx="1306399" cy="511531"/>
+          </a:xfrm>
+          <a:prstGeom prst="roundRect">
+            <a:avLst/>
+          </a:prstGeom>
+        </p:spPr>
+        <p:style>
+          <a:lnRef idx="2">
+            <a:schemeClr val="accent1">
+              <a:shade val="50000"/>
+            </a:schemeClr>
+          </a:lnRef>
+          <a:fillRef idx="1">
+            <a:schemeClr val="accent1"/>
+          </a:fillRef>
+          <a:effectRef idx="0">
+            <a:schemeClr val="accent1"/>
+          </a:effectRef>
+          <a:fontRef idx="minor">
+            <a:schemeClr val="lt1"/>
+          </a:fontRef>
+        </p:style>
+        <p:txBody>
+          <a:bodyPr rtlCol="0" anchor="ctr"/>
+          <a:lstStyle/>
+          <a:p>
+            <a:pPr algn="ctr"/>
+            <a:r>
+              <a:rPr kumimoji="1" lang="en-US" altLang="ko-KR" sz="1200" smtClean="0"/>
+              <a:t>decoView</a:t>
+            </a:r>
+            <a:endParaRPr kumimoji="1" lang="en-US" altLang="ko-KR" sz="1200" dirty="0" smtClean="0"/>
+          </a:p>
+        </p:txBody>
+      </p:sp>
+      <p:sp>
+        <p:nvSpPr>
+          <p:cNvPr id="47" name="모서리가 둥근 직사각형 46"/>
+          <p:cNvSpPr/>
+          <p:nvPr/>
+        </p:nvSpPr>
+        <p:spPr>
+          <a:xfrm>
+            <a:off x="5009283" y="5360867"/>
+            <a:ext cx="1306399" cy="511531"/>
+          </a:xfrm>
+          <a:prstGeom prst="roundRect">
+            <a:avLst/>
+          </a:prstGeom>
+        </p:spPr>
+        <p:style>
+          <a:lnRef idx="2">
+            <a:schemeClr val="accent1">
+              <a:shade val="50000"/>
+            </a:schemeClr>
+          </a:lnRef>
+          <a:fillRef idx="1">
+            <a:schemeClr val="accent1"/>
+          </a:fillRef>
+          <a:effectRef idx="0">
+            <a:schemeClr val="accent1"/>
+          </a:effectRef>
+          <a:fontRef idx="minor">
+            <a:schemeClr val="lt1"/>
+          </a:fontRef>
+        </p:style>
+        <p:txBody>
+          <a:bodyPr rtlCol="0" anchor="ctr"/>
+          <a:lstStyle/>
+          <a:p>
+            <a:pPr algn="ctr"/>
+            <a:r>
+              <a:rPr kumimoji="1" lang="en-US" altLang="ko-KR" sz="1200" dirty="0" err="1" smtClean="0"/>
+              <a:t>ContentView</a:t>
+            </a:r>
+            <a:endParaRPr kumimoji="1" lang="en-US" altLang="ko-KR" sz="1200" dirty="0" smtClean="0"/>
+          </a:p>
+        </p:txBody>
+      </p:sp>
+      <p:sp>
+        <p:nvSpPr>
+          <p:cNvPr id="48" name="모서리가 둥근 직사각형 47"/>
+          <p:cNvSpPr/>
+          <p:nvPr/>
+        </p:nvSpPr>
+        <p:spPr>
+          <a:xfrm>
+            <a:off x="4250987" y="6178025"/>
+            <a:ext cx="1306399" cy="511531"/>
+          </a:xfrm>
+          <a:prstGeom prst="roundRect">
+            <a:avLst/>
+          </a:prstGeom>
+        </p:spPr>
+        <p:style>
+          <a:lnRef idx="2">
+            <a:schemeClr val="accent1">
+              <a:shade val="50000"/>
+            </a:schemeClr>
+          </a:lnRef>
+          <a:fillRef idx="1">
+            <a:schemeClr val="accent1"/>
+          </a:fillRef>
+          <a:effectRef idx="0">
+            <a:schemeClr val="accent1"/>
+          </a:effectRef>
+          <a:fontRef idx="minor">
+            <a:schemeClr val="lt1"/>
+          </a:fontRef>
+        </p:style>
+        <p:txBody>
+          <a:bodyPr rtlCol="0" anchor="ctr"/>
+          <a:lstStyle/>
+          <a:p>
+            <a:pPr algn="ctr"/>
+            <a:r>
+              <a:rPr kumimoji="1" lang="en-US" altLang="ko-KR" sz="1200" smtClean="0"/>
+              <a:t>button1</a:t>
+            </a:r>
+            <a:endParaRPr kumimoji="1" lang="en-US" altLang="ko-KR" sz="1200" dirty="0" smtClean="0"/>
+          </a:p>
+        </p:txBody>
+      </p:sp>
+      <p:sp>
+        <p:nvSpPr>
+          <p:cNvPr id="49" name="모서리가 둥근 직사각형 48"/>
+          <p:cNvSpPr/>
+          <p:nvPr/>
+        </p:nvSpPr>
+        <p:spPr>
+          <a:xfrm>
+            <a:off x="5872384" y="6178024"/>
+            <a:ext cx="1306399" cy="511531"/>
+          </a:xfrm>
+          <a:prstGeom prst="roundRect">
+            <a:avLst/>
+          </a:prstGeom>
+        </p:spPr>
+        <p:style>
+          <a:lnRef idx="2">
+            <a:schemeClr val="accent1">
+              <a:shade val="50000"/>
+            </a:schemeClr>
+          </a:lnRef>
+          <a:fillRef idx="1">
+            <a:schemeClr val="accent1"/>
+          </a:fillRef>
+          <a:effectRef idx="0">
+            <a:schemeClr val="accent1"/>
+          </a:effectRef>
+          <a:fontRef idx="minor">
+            <a:schemeClr val="lt1"/>
+          </a:fontRef>
+        </p:style>
+        <p:txBody>
+          <a:bodyPr rtlCol="0" anchor="ctr"/>
+          <a:lstStyle/>
+          <a:p>
+            <a:pPr algn="ctr"/>
+            <a:r>
+              <a:rPr kumimoji="1" lang="en-US" altLang="ko-KR" sz="1200" dirty="0" smtClean="0"/>
+              <a:t>button2</a:t>
+            </a:r>
+          </a:p>
+        </p:txBody>
+      </p:sp>
+      <p:sp>
+        <p:nvSpPr>
+          <p:cNvPr id="50" name="폭발 2[E] 49"/>
+          <p:cNvSpPr/>
+          <p:nvPr/>
+        </p:nvSpPr>
+        <p:spPr>
+          <a:xfrm>
+            <a:off x="3147474" y="5626359"/>
+            <a:ext cx="1862006" cy="953500"/>
+          </a:xfrm>
+          <a:prstGeom prst="irregularSeal2">
+            <a:avLst/>
+          </a:prstGeom>
+          <a:solidFill>
+            <a:srgbClr val="FF0000"/>
+          </a:solidFill>
+        </p:spPr>
+        <p:style>
+          <a:lnRef idx="2">
+            <a:schemeClr val="accent1">
+              <a:shade val="50000"/>
+            </a:schemeClr>
+          </a:lnRef>
+          <a:fillRef idx="1">
+            <a:schemeClr val="accent1"/>
+          </a:fillRef>
+          <a:effectRef idx="0">
+            <a:schemeClr val="accent1"/>
+          </a:effectRef>
+          <a:fontRef idx="minor">
+            <a:schemeClr val="lt1"/>
+          </a:fontRef>
+        </p:style>
+        <p:txBody>
+          <a:bodyPr rtlCol="0" anchor="ctr"/>
+          <a:lstStyle/>
+          <a:p>
+            <a:pPr algn="ctr"/>
+            <a:r>
+              <a:rPr kumimoji="1" lang="en-US" altLang="ko-KR" sz="1000" dirty="0" smtClean="0"/>
+              <a:t>Consumed!</a:t>
+            </a:r>
+            <a:endParaRPr kumimoji="1" lang="ko-KR" altLang="en-US" sz="1000" dirty="0"/>
+          </a:p>
+        </p:txBody>
+      </p:sp>
+      <p:sp>
+        <p:nvSpPr>
+          <p:cNvPr id="51" name="모서리가 둥근 직사각형 50"/>
+          <p:cNvSpPr/>
+          <p:nvPr/>
+        </p:nvSpPr>
+        <p:spPr>
+          <a:xfrm>
+            <a:off x="414807" y="5360867"/>
+            <a:ext cx="1075386" cy="511531"/>
+          </a:xfrm>
+          <a:prstGeom prst="roundRect">
+            <a:avLst/>
+          </a:prstGeom>
+        </p:spPr>
+        <p:style>
+          <a:lnRef idx="2">
+            <a:schemeClr val="accent1">
+              <a:shade val="50000"/>
+            </a:schemeClr>
+          </a:lnRef>
+          <a:fillRef idx="1">
+            <a:schemeClr val="accent1"/>
+          </a:fillRef>
+          <a:effectRef idx="0">
+            <a:schemeClr val="accent1"/>
+          </a:effectRef>
+          <a:fontRef idx="minor">
+            <a:schemeClr val="lt1"/>
+          </a:fontRef>
+        </p:style>
+        <p:txBody>
+          <a:bodyPr rtlCol="0" anchor="ctr"/>
+          <a:lstStyle/>
+          <a:p>
+            <a:pPr algn="ctr"/>
+            <a:r>
+              <a:rPr kumimoji="1" lang="en-US" altLang="ko-KR" sz="1200" dirty="0" smtClean="0"/>
+              <a:t>Status bar</a:t>
+            </a:r>
+          </a:p>
+        </p:txBody>
+      </p:sp>
+      <p:sp>
+        <p:nvSpPr>
+          <p:cNvPr id="52" name="모서리가 둥근 직사각형 51"/>
+          <p:cNvSpPr/>
+          <p:nvPr/>
+        </p:nvSpPr>
+        <p:spPr>
+          <a:xfrm>
+            <a:off x="1823315" y="5358339"/>
+            <a:ext cx="1313904" cy="511531"/>
+          </a:xfrm>
+          <a:prstGeom prst="roundRect">
+            <a:avLst/>
+          </a:prstGeom>
+        </p:spPr>
+        <p:style>
+          <a:lnRef idx="2">
+            <a:schemeClr val="accent1">
+              <a:shade val="50000"/>
+            </a:schemeClr>
+          </a:lnRef>
+          <a:fillRef idx="1">
+            <a:schemeClr val="accent1"/>
+          </a:fillRef>
+          <a:effectRef idx="0">
+            <a:schemeClr val="accent1"/>
+          </a:effectRef>
+          <a:fontRef idx="minor">
+            <a:schemeClr val="lt1"/>
+          </a:fontRef>
+        </p:style>
+        <p:txBody>
+          <a:bodyPr rtlCol="0" anchor="ctr"/>
+          <a:lstStyle/>
+          <a:p>
+            <a:pPr algn="ctr"/>
+            <a:r>
+              <a:rPr kumimoji="1" lang="en-US" altLang="ko-KR" sz="1200" dirty="0" smtClean="0"/>
+              <a:t>Navigation bar</a:t>
+            </a:r>
+          </a:p>
+        </p:txBody>
+      </p:sp>
+      <p:cxnSp>
+        <p:nvCxnSpPr>
+          <p:cNvPr id="55" name="직선 화살표 연결선 54"/>
+          <p:cNvCxnSpPr>
+            <a:stCxn id="43" idx="0"/>
+            <a:endCxn id="44" idx="3"/>
+          </p:cNvCxnSpPr>
+          <p:nvPr/>
+        </p:nvCxnSpPr>
+        <p:spPr>
+          <a:xfrm flipH="1" flipV="1">
+            <a:off x="8350666" y="3853126"/>
+            <a:ext cx="1316442" cy="605447"/>
+          </a:xfrm>
+          <a:prstGeom prst="straightConnector1">
+            <a:avLst/>
+          </a:prstGeom>
+          <a:ln w="12700">
+            <a:tailEnd type="stealth" w="lg" len="lg"/>
+          </a:ln>
+        </p:spPr>
+        <p:style>
+          <a:lnRef idx="1">
+            <a:schemeClr val="accent1"/>
+          </a:lnRef>
+          <a:fillRef idx="0">
+            <a:schemeClr val="accent1"/>
+          </a:fillRef>
+          <a:effectRef idx="0">
+            <a:schemeClr val="accent1"/>
+          </a:effectRef>
+          <a:fontRef idx="minor">
+            <a:schemeClr val="tx1"/>
+          </a:fontRef>
+        </p:style>
+      </p:cxnSp>
+      <p:cxnSp>
+        <p:nvCxnSpPr>
+          <p:cNvPr id="57" name="직선 화살표 연결선 56"/>
+          <p:cNvCxnSpPr/>
+          <p:nvPr/>
+        </p:nvCxnSpPr>
+        <p:spPr>
+          <a:xfrm>
+            <a:off x="7315200" y="4108891"/>
+            <a:ext cx="1" cy="356208"/>
+          </a:xfrm>
+          <a:prstGeom prst="straightConnector1">
+            <a:avLst/>
+          </a:prstGeom>
+          <a:ln w="12700">
+            <a:tailEnd type="stealth" w="lg" len="lg"/>
+          </a:ln>
+        </p:spPr>
+        <p:style>
+          <a:lnRef idx="1">
+            <a:schemeClr val="accent1"/>
+          </a:lnRef>
+          <a:fillRef idx="0">
+            <a:schemeClr val="accent1"/>
+          </a:fillRef>
+          <a:effectRef idx="0">
+            <a:schemeClr val="accent1"/>
+          </a:effectRef>
+          <a:fontRef idx="minor">
+            <a:schemeClr val="tx1"/>
+          </a:fontRef>
+        </p:style>
+      </p:cxnSp>
+      <p:cxnSp>
+        <p:nvCxnSpPr>
+          <p:cNvPr id="60" name="직선 화살표 연결선 59"/>
+          <p:cNvCxnSpPr/>
+          <p:nvPr/>
+        </p:nvCxnSpPr>
+        <p:spPr>
+          <a:xfrm flipV="1">
+            <a:off x="8048978" y="4108891"/>
+            <a:ext cx="0" cy="349682"/>
+          </a:xfrm>
+          <a:prstGeom prst="straightConnector1">
+            <a:avLst/>
+          </a:prstGeom>
+          <a:ln w="12700">
+            <a:tailEnd type="stealth" w="lg" len="lg"/>
+          </a:ln>
+        </p:spPr>
+        <p:style>
+          <a:lnRef idx="1">
+            <a:schemeClr val="accent1"/>
+          </a:lnRef>
+          <a:fillRef idx="0">
+            <a:schemeClr val="accent1"/>
+          </a:fillRef>
+          <a:effectRef idx="0">
+            <a:schemeClr val="accent1"/>
+          </a:effectRef>
+          <a:fontRef idx="minor">
+            <a:schemeClr val="tx1"/>
+          </a:fontRef>
+        </p:style>
+      </p:cxnSp>
+      <p:cxnSp>
+        <p:nvCxnSpPr>
+          <p:cNvPr id="62" name="직선 화살표 연결선 61"/>
+          <p:cNvCxnSpPr/>
+          <p:nvPr/>
+        </p:nvCxnSpPr>
+        <p:spPr>
+          <a:xfrm flipH="1">
+            <a:off x="6315682" y="4560711"/>
+            <a:ext cx="728584" cy="11289"/>
+          </a:xfrm>
+          <a:prstGeom prst="straightConnector1">
+            <a:avLst/>
+          </a:prstGeom>
+          <a:ln w="12700">
+            <a:tailEnd type="stealth" w="lg" len="lg"/>
+          </a:ln>
+        </p:spPr>
+        <p:style>
+          <a:lnRef idx="1">
+            <a:schemeClr val="accent1"/>
+          </a:lnRef>
+          <a:fillRef idx="0">
+            <a:schemeClr val="accent1"/>
+          </a:fillRef>
+          <a:effectRef idx="0">
+            <a:schemeClr val="accent1"/>
+          </a:effectRef>
+          <a:fontRef idx="minor">
+            <a:schemeClr val="tx1"/>
+          </a:fontRef>
+        </p:style>
+      </p:cxnSp>
+      <p:cxnSp>
+        <p:nvCxnSpPr>
+          <p:cNvPr id="64" name="직선 화살표 연결선 63"/>
+          <p:cNvCxnSpPr/>
+          <p:nvPr/>
+        </p:nvCxnSpPr>
+        <p:spPr>
+          <a:xfrm>
+            <a:off x="6327423" y="4834647"/>
+            <a:ext cx="716843" cy="0"/>
+          </a:xfrm>
+          <a:prstGeom prst="straightConnector1">
+            <a:avLst/>
+          </a:prstGeom>
+          <a:ln w="12700">
+            <a:tailEnd type="stealth" w="lg" len="lg"/>
+          </a:ln>
+        </p:spPr>
+        <p:style>
+          <a:lnRef idx="1">
+            <a:schemeClr val="accent1"/>
+          </a:lnRef>
+          <a:fillRef idx="0">
+            <a:schemeClr val="accent1"/>
+          </a:fillRef>
+          <a:effectRef idx="0">
+            <a:schemeClr val="accent1"/>
+          </a:effectRef>
+          <a:fontRef idx="minor">
+            <a:schemeClr val="tx1"/>
+          </a:fontRef>
+        </p:style>
+      </p:cxnSp>
+      <p:cxnSp>
+        <p:nvCxnSpPr>
+          <p:cNvPr id="67" name="직선 화살표 연결선 66"/>
+          <p:cNvCxnSpPr/>
+          <p:nvPr/>
+        </p:nvCxnSpPr>
+        <p:spPr>
+          <a:xfrm>
+            <a:off x="5443331" y="4976630"/>
+            <a:ext cx="0" cy="381709"/>
+          </a:xfrm>
+          <a:prstGeom prst="straightConnector1">
+            <a:avLst/>
+          </a:prstGeom>
+          <a:ln w="12700">
+            <a:tailEnd type="stealth" w="lg" len="lg"/>
+          </a:ln>
+        </p:spPr>
+        <p:style>
+          <a:lnRef idx="1">
+            <a:schemeClr val="accent1"/>
+          </a:lnRef>
+          <a:fillRef idx="0">
+            <a:schemeClr val="accent1"/>
+          </a:fillRef>
+          <a:effectRef idx="0">
+            <a:schemeClr val="accent1"/>
+          </a:effectRef>
+          <a:fontRef idx="minor">
+            <a:schemeClr val="tx1"/>
+          </a:fontRef>
+        </p:style>
+      </p:cxnSp>
+      <p:cxnSp>
+        <p:nvCxnSpPr>
+          <p:cNvPr id="69" name="직선 화살표 연결선 68"/>
+          <p:cNvCxnSpPr/>
+          <p:nvPr/>
+        </p:nvCxnSpPr>
+        <p:spPr>
+          <a:xfrm flipV="1">
+            <a:off x="5872384" y="4976630"/>
+            <a:ext cx="0" cy="381709"/>
+          </a:xfrm>
+          <a:prstGeom prst="straightConnector1">
+            <a:avLst/>
+          </a:prstGeom>
+          <a:ln w="12700">
+            <a:tailEnd type="stealth" w="lg" len="lg"/>
+          </a:ln>
+        </p:spPr>
+        <p:style>
+          <a:lnRef idx="1">
+            <a:schemeClr val="accent1"/>
+          </a:lnRef>
+          <a:fillRef idx="0">
+            <a:schemeClr val="accent1"/>
+          </a:fillRef>
+          <a:effectRef idx="0">
+            <a:schemeClr val="accent1"/>
+          </a:effectRef>
+          <a:fontRef idx="minor">
+            <a:schemeClr val="tx1"/>
+          </a:fontRef>
+        </p:style>
+      </p:cxnSp>
+      <p:cxnSp>
+        <p:nvCxnSpPr>
+          <p:cNvPr id="71" name="직선 화살표 연결선 70"/>
+          <p:cNvCxnSpPr>
+            <a:endCxn id="48" idx="0"/>
+          </p:cNvCxnSpPr>
+          <p:nvPr/>
+        </p:nvCxnSpPr>
+        <p:spPr>
+          <a:xfrm flipH="1">
+            <a:off x="4904187" y="5869870"/>
+            <a:ext cx="348749" cy="308155"/>
+          </a:xfrm>
+          <a:prstGeom prst="straightConnector1">
+            <a:avLst/>
+          </a:prstGeom>
+          <a:ln w="12700">
+            <a:tailEnd type="stealth" w="lg" len="lg"/>
+          </a:ln>
+        </p:spPr>
+        <p:style>
+          <a:lnRef idx="1">
+            <a:schemeClr val="accent1"/>
+          </a:lnRef>
+          <a:fillRef idx="0">
+            <a:schemeClr val="accent1"/>
+          </a:fillRef>
+          <a:effectRef idx="0">
+            <a:schemeClr val="accent1"/>
+          </a:effectRef>
+          <a:fontRef idx="minor">
+            <a:schemeClr val="tx1"/>
+          </a:fontRef>
+        </p:style>
+      </p:cxnSp>
+      <p:cxnSp>
+        <p:nvCxnSpPr>
+          <p:cNvPr id="73" name="직선 화살표 연결선 72"/>
+          <p:cNvCxnSpPr/>
+          <p:nvPr/>
+        </p:nvCxnSpPr>
+        <p:spPr>
+          <a:xfrm>
+            <a:off x="5872384" y="5869870"/>
+            <a:ext cx="325216" cy="308154"/>
+          </a:xfrm>
+          <a:prstGeom prst="straightConnector1">
+            <a:avLst/>
+          </a:prstGeom>
+          <a:ln w="12700">
+            <a:tailEnd type="stealth" w="lg" len="lg"/>
+          </a:ln>
+        </p:spPr>
+        <p:style>
+          <a:lnRef idx="1">
+            <a:schemeClr val="accent1"/>
+          </a:lnRef>
+          <a:fillRef idx="0">
+            <a:schemeClr val="accent1"/>
+          </a:fillRef>
+          <a:effectRef idx="0">
+            <a:schemeClr val="accent1"/>
+          </a:effectRef>
+          <a:fontRef idx="minor">
+            <a:schemeClr val="tx1"/>
+          </a:fontRef>
+        </p:style>
+      </p:cxnSp>
+      <p:cxnSp>
+        <p:nvCxnSpPr>
+          <p:cNvPr id="75" name="직선 화살표 연결선 74"/>
+          <p:cNvCxnSpPr>
+            <a:stCxn id="49" idx="0"/>
+          </p:cNvCxnSpPr>
+          <p:nvPr/>
+        </p:nvCxnSpPr>
+        <p:spPr>
+          <a:xfrm flipH="1" flipV="1">
+            <a:off x="6176834" y="5869870"/>
+            <a:ext cx="348750" cy="308154"/>
+          </a:xfrm>
+          <a:prstGeom prst="straightConnector1">
+            <a:avLst/>
+          </a:prstGeom>
+          <a:ln w="12700">
+            <a:tailEnd type="stealth" w="lg" len="lg"/>
+          </a:ln>
+        </p:spPr>
+        <p:style>
+          <a:lnRef idx="1">
+            <a:schemeClr val="accent1"/>
+          </a:lnRef>
+          <a:fillRef idx="0">
+            <a:schemeClr val="accent1"/>
+          </a:fillRef>
+          <a:effectRef idx="0">
+            <a:schemeClr val="accent1"/>
+          </a:effectRef>
+          <a:fontRef idx="minor">
+            <a:schemeClr val="tx1"/>
+          </a:fontRef>
+        </p:style>
+      </p:cxnSp>
+      <p:cxnSp>
+        <p:nvCxnSpPr>
+          <p:cNvPr id="77" name="꺾인 연결선[E] 76"/>
+          <p:cNvCxnSpPr>
+            <a:stCxn id="46" idx="1"/>
+            <a:endCxn id="52" idx="0"/>
+          </p:cNvCxnSpPr>
+          <p:nvPr/>
+        </p:nvCxnSpPr>
+        <p:spPr>
+          <a:xfrm rot="10800000" flipV="1">
+            <a:off x="2480268" y="4720865"/>
+            <a:ext cx="2529017" cy="637474"/>
+          </a:xfrm>
+          <a:prstGeom prst="bentConnector2">
+            <a:avLst/>
+          </a:prstGeom>
+          <a:ln w="12700">
+            <a:tailEnd type="stealth" w="lg" len="lg"/>
+          </a:ln>
+        </p:spPr>
+        <p:style>
+          <a:lnRef idx="1">
+            <a:schemeClr val="accent1"/>
+          </a:lnRef>
+          <a:fillRef idx="0">
+            <a:schemeClr val="accent1"/>
+          </a:fillRef>
+          <a:effectRef idx="0">
+            <a:schemeClr val="accent1"/>
+          </a:effectRef>
+          <a:fontRef idx="minor">
+            <a:schemeClr val="tx1"/>
+          </a:fontRef>
+        </p:style>
+      </p:cxnSp>
+      <p:cxnSp>
+        <p:nvCxnSpPr>
+          <p:cNvPr id="79" name="꺾인 연결선[E] 78"/>
+          <p:cNvCxnSpPr>
+            <a:stCxn id="46" idx="1"/>
+            <a:endCxn id="51" idx="0"/>
+          </p:cNvCxnSpPr>
+          <p:nvPr/>
+        </p:nvCxnSpPr>
+        <p:spPr>
+          <a:xfrm rot="10800000" flipV="1">
+            <a:off x="952500" y="4720865"/>
+            <a:ext cx="4056784" cy="640002"/>
+          </a:xfrm>
+          <a:prstGeom prst="bentConnector2">
+            <a:avLst/>
+          </a:prstGeom>
+          <a:ln w="12700">
+            <a:tailEnd type="stealth" w="lg" len="lg"/>
+          </a:ln>
+        </p:spPr>
+        <p:style>
+          <a:lnRef idx="1">
+            <a:schemeClr val="accent1"/>
+          </a:lnRef>
+          <a:fillRef idx="0">
+            <a:schemeClr val="accent1"/>
+          </a:fillRef>
+          <a:effectRef idx="0">
+            <a:schemeClr val="accent1"/>
+          </a:effectRef>
+          <a:fontRef idx="minor">
+            <a:schemeClr val="tx1"/>
+          </a:fontRef>
+        </p:style>
+      </p:cxnSp>
+      <p:cxnSp>
+        <p:nvCxnSpPr>
+          <p:cNvPr id="81" name="직선 화살표 연결선 80"/>
+          <p:cNvCxnSpPr>
+            <a:stCxn id="18" idx="2"/>
+            <a:endCxn id="22" idx="0"/>
+          </p:cNvCxnSpPr>
+          <p:nvPr/>
+        </p:nvCxnSpPr>
+        <p:spPr>
+          <a:xfrm>
+            <a:off x="7879405" y="596855"/>
+            <a:ext cx="621128" cy="307817"/>
+          </a:xfrm>
+          <a:prstGeom prst="straightConnector1">
+            <a:avLst/>
+          </a:prstGeom>
+          <a:ln w="19050">
+            <a:headEnd type="none" w="lg" len="lg"/>
+            <a:tailEnd type="stealth" w="lg" len="lg"/>
+          </a:ln>
+        </p:spPr>
+        <p:style>
+          <a:lnRef idx="1">
+            <a:schemeClr val="accent1"/>
+          </a:lnRef>
+          <a:fillRef idx="0">
+            <a:schemeClr val="accent1"/>
+          </a:fillRef>
+          <a:effectRef idx="0">
+            <a:schemeClr val="accent1"/>
+          </a:effectRef>
+          <a:fontRef idx="minor">
+            <a:schemeClr val="tx1"/>
+          </a:fontRef>
+        </p:style>
+      </p:cxnSp>
+      <p:cxnSp>
+        <p:nvCxnSpPr>
+          <p:cNvPr id="83" name="직선 화살표 연결선 82"/>
+          <p:cNvCxnSpPr>
+            <a:stCxn id="22" idx="2"/>
+            <a:endCxn id="23" idx="0"/>
+          </p:cNvCxnSpPr>
+          <p:nvPr/>
+        </p:nvCxnSpPr>
+        <p:spPr>
+          <a:xfrm>
+            <a:off x="8500533" y="1400783"/>
+            <a:ext cx="0" cy="321012"/>
+          </a:xfrm>
+          <a:prstGeom prst="straightConnector1">
+            <a:avLst/>
+          </a:prstGeom>
+          <a:ln w="19050">
+            <a:headEnd type="none" w="lg" len="lg"/>
+            <a:tailEnd type="stealth" w="lg" len="lg"/>
+          </a:ln>
+        </p:spPr>
+        <p:style>
+          <a:lnRef idx="1">
+            <a:schemeClr val="accent1"/>
+          </a:lnRef>
+          <a:fillRef idx="0">
+            <a:schemeClr val="accent1"/>
+          </a:fillRef>
+          <a:effectRef idx="0">
+            <a:schemeClr val="accent1"/>
+          </a:effectRef>
+          <a:fontRef idx="minor">
+            <a:schemeClr val="tx1"/>
+          </a:fontRef>
+        </p:style>
+      </p:cxnSp>
+      <p:cxnSp>
+        <p:nvCxnSpPr>
+          <p:cNvPr id="86" name="직선 화살표 연결선 85"/>
+          <p:cNvCxnSpPr>
+            <a:stCxn id="23" idx="2"/>
+            <a:endCxn id="24" idx="0"/>
+          </p:cNvCxnSpPr>
+          <p:nvPr/>
+        </p:nvCxnSpPr>
+        <p:spPr>
+          <a:xfrm flipH="1">
+            <a:off x="7850695" y="2210181"/>
+            <a:ext cx="649838" cy="318632"/>
+          </a:xfrm>
+          <a:prstGeom prst="straightConnector1">
+            <a:avLst/>
+          </a:prstGeom>
+          <a:ln w="19050">
+            <a:headEnd type="none" w="lg" len="lg"/>
+            <a:tailEnd type="stealth" w="lg" len="lg"/>
+          </a:ln>
+        </p:spPr>
+        <p:style>
+          <a:lnRef idx="1">
+            <a:schemeClr val="accent1"/>
+          </a:lnRef>
+          <a:fillRef idx="0">
+            <a:schemeClr val="accent1"/>
+          </a:fillRef>
+          <a:effectRef idx="0">
+            <a:schemeClr val="accent1"/>
+          </a:effectRef>
+          <a:fontRef idx="minor">
+            <a:schemeClr val="tx1"/>
+          </a:fontRef>
+        </p:style>
+      </p:cxnSp>
+      <p:cxnSp>
+        <p:nvCxnSpPr>
+          <p:cNvPr id="88" name="직선 화살표 연결선 87"/>
+          <p:cNvCxnSpPr>
+            <a:stCxn id="23" idx="2"/>
+            <a:endCxn id="25" idx="0"/>
+          </p:cNvCxnSpPr>
+          <p:nvPr/>
+        </p:nvCxnSpPr>
+        <p:spPr>
+          <a:xfrm>
+            <a:off x="8500533" y="2210181"/>
+            <a:ext cx="649839" cy="321390"/>
+          </a:xfrm>
+          <a:prstGeom prst="straightConnector1">
+            <a:avLst/>
+          </a:prstGeom>
+          <a:ln w="19050">
+            <a:headEnd type="none" w="lg" len="lg"/>
+            <a:tailEnd type="stealth" w="lg" len="lg"/>
+          </a:ln>
+        </p:spPr>
+        <p:style>
+          <a:lnRef idx="1">
+            <a:schemeClr val="accent1"/>
+          </a:lnRef>
+          <a:fillRef idx="0">
+            <a:schemeClr val="accent1"/>
+          </a:fillRef>
+          <a:effectRef idx="0">
+            <a:schemeClr val="accent1"/>
+          </a:effectRef>
+          <a:fontRef idx="minor">
+            <a:schemeClr val="tx1"/>
+          </a:fontRef>
+        </p:style>
+      </p:cxnSp>
+      <p:cxnSp>
+        <p:nvCxnSpPr>
+          <p:cNvPr id="90" name="꺾인 연결선[E] 89"/>
+          <p:cNvCxnSpPr>
+            <a:stCxn id="18" idx="1"/>
+            <a:endCxn id="21" idx="0"/>
+          </p:cNvCxnSpPr>
+          <p:nvPr/>
+        </p:nvCxnSpPr>
+        <p:spPr>
+          <a:xfrm rot="10800000" flipV="1">
+            <a:off x="6327423" y="393730"/>
+            <a:ext cx="802952" cy="510942"/>
+          </a:xfrm>
+          <a:prstGeom prst="bentConnector2">
+            <a:avLst/>
+          </a:prstGeom>
+          <a:ln w="19050">
+            <a:headEnd type="none" w="lg" len="lg"/>
+            <a:tailEnd type="stealth" w="lg" len="lg"/>
+          </a:ln>
+        </p:spPr>
+        <p:style>
+          <a:lnRef idx="1">
+            <a:schemeClr val="accent1"/>
+          </a:lnRef>
+          <a:fillRef idx="0">
+            <a:schemeClr val="accent1"/>
+          </a:fillRef>
+          <a:effectRef idx="0">
+            <a:schemeClr val="accent1"/>
+          </a:effectRef>
+          <a:fontRef idx="minor">
+            <a:schemeClr val="tx1"/>
+          </a:fontRef>
+        </p:style>
+      </p:cxnSp>
+      <p:cxnSp>
+        <p:nvCxnSpPr>
+          <p:cNvPr id="92" name="꺾인 연결선[E] 91"/>
+          <p:cNvCxnSpPr>
+            <a:stCxn id="18" idx="1"/>
+            <a:endCxn id="20" idx="0"/>
+          </p:cNvCxnSpPr>
+          <p:nvPr/>
+        </p:nvCxnSpPr>
+        <p:spPr>
+          <a:xfrm rot="10800000" flipV="1">
+            <a:off x="4751963" y="393730"/>
+            <a:ext cx="2378413" cy="510942"/>
+          </a:xfrm>
+          <a:prstGeom prst="bentConnector2">
+            <a:avLst/>
+          </a:prstGeom>
+          <a:ln w="19050">
+            <a:headEnd type="none" w="lg" len="lg"/>
+            <a:tailEnd type="stealth" w="lg" len="lg"/>
+          </a:ln>
+        </p:spPr>
+        <p:style>
+          <a:lnRef idx="1">
+            <a:schemeClr val="accent1"/>
+          </a:lnRef>
+          <a:fillRef idx="0">
+            <a:schemeClr val="accent1"/>
+          </a:fillRef>
+          <a:effectRef idx="0">
+            <a:schemeClr val="accent1"/>
+          </a:effectRef>
+          <a:fontRef idx="minor">
+            <a:schemeClr val="tx1"/>
+          </a:fontRef>
+        </p:style>
+      </p:cxnSp>
+      <p:sp>
+        <p:nvSpPr>
+          <p:cNvPr id="96" name="타원 95"/>
+          <p:cNvSpPr/>
+          <p:nvPr/>
+        </p:nvSpPr>
+        <p:spPr>
+          <a:xfrm>
+            <a:off x="5799687" y="5120889"/>
+            <a:ext cx="150385" cy="165463"/>
+          </a:xfrm>
+          <a:prstGeom prst="ellipse">
+            <a:avLst/>
+          </a:prstGeom>
+          <a:solidFill>
+            <a:srgbClr val="FFFF00"/>
+          </a:solidFill>
+          <a:ln>
+            <a:solidFill>
+              <a:schemeClr val="tx1"/>
+            </a:solidFill>
+          </a:ln>
+        </p:spPr>
+        <p:style>
+          <a:lnRef idx="2">
+            <a:schemeClr val="accent1">
+              <a:shade val="50000"/>
+            </a:schemeClr>
+          </a:lnRef>
+          <a:fillRef idx="1">
+            <a:schemeClr val="accent1"/>
+          </a:fillRef>
+          <a:effectRef idx="0">
+            <a:schemeClr val="accent1"/>
+          </a:effectRef>
+          <a:fontRef idx="minor">
+            <a:schemeClr val="lt1"/>
+          </a:fontRef>
+        </p:style>
+        <p:txBody>
+          <a:bodyPr lIns="0" tIns="0" rIns="0" bIns="0" rtlCol="0" anchor="ctr"/>
+          <a:lstStyle/>
+          <a:p>
+            <a:pPr algn="ctr"/>
+            <a:r>
+              <a:rPr kumimoji="1" lang="en-US" altLang="ko-KR" sz="700" b="1" dirty="0" smtClean="0">
+                <a:solidFill>
+                  <a:schemeClr val="tx1"/>
+                </a:solidFill>
+              </a:rPr>
+              <a:t>8</a:t>
+            </a:r>
+            <a:endParaRPr kumimoji="1" lang="ko-KR" altLang="en-US" sz="700" b="1" dirty="0">
+              <a:solidFill>
+                <a:schemeClr val="tx1"/>
+              </a:solidFill>
+            </a:endParaRPr>
+          </a:p>
+        </p:txBody>
+      </p:sp>
+      <p:sp>
+        <p:nvSpPr>
+          <p:cNvPr id="97" name="타원 96"/>
+          <p:cNvSpPr/>
+          <p:nvPr/>
+        </p:nvSpPr>
+        <p:spPr>
+          <a:xfrm>
+            <a:off x="8896740" y="4048393"/>
+            <a:ext cx="150385" cy="165463"/>
+          </a:xfrm>
+          <a:prstGeom prst="ellipse">
+            <a:avLst/>
+          </a:prstGeom>
+          <a:solidFill>
+            <a:srgbClr val="FFFF00"/>
+          </a:solidFill>
+          <a:ln>
+            <a:solidFill>
+              <a:schemeClr val="tx1"/>
+            </a:solidFill>
+          </a:ln>
+        </p:spPr>
+        <p:style>
+          <a:lnRef idx="2">
+            <a:schemeClr val="accent1">
+              <a:shade val="50000"/>
+            </a:schemeClr>
+          </a:lnRef>
+          <a:fillRef idx="1">
+            <a:schemeClr val="accent1"/>
+          </a:fillRef>
+          <a:effectRef idx="0">
+            <a:schemeClr val="accent1"/>
+          </a:effectRef>
+          <a:fontRef idx="minor">
+            <a:schemeClr val="lt1"/>
+          </a:fontRef>
+        </p:style>
+        <p:txBody>
+          <a:bodyPr lIns="0" tIns="0" rIns="0" bIns="0" rtlCol="0" anchor="ctr"/>
+          <a:lstStyle/>
+          <a:p>
+            <a:pPr algn="ctr"/>
+            <a:r>
+              <a:rPr kumimoji="1" lang="en-US" altLang="ko-KR" sz="700" b="1" dirty="0">
+                <a:solidFill>
+                  <a:schemeClr val="tx1"/>
+                </a:solidFill>
+              </a:rPr>
+              <a:t>1</a:t>
+            </a:r>
+            <a:endParaRPr kumimoji="1" lang="ko-KR" altLang="en-US" sz="700" b="1" dirty="0">
+              <a:solidFill>
+                <a:schemeClr val="tx1"/>
+              </a:solidFill>
+            </a:endParaRPr>
+          </a:p>
+        </p:txBody>
+      </p:sp>
+      <p:sp>
+        <p:nvSpPr>
+          <p:cNvPr id="98" name="타원 97"/>
+          <p:cNvSpPr/>
+          <p:nvPr/>
+        </p:nvSpPr>
+        <p:spPr>
+          <a:xfrm>
+            <a:off x="7245394" y="4164964"/>
+            <a:ext cx="150385" cy="165463"/>
+          </a:xfrm>
+          <a:prstGeom prst="ellipse">
+            <a:avLst/>
+          </a:prstGeom>
+          <a:solidFill>
+            <a:srgbClr val="FFFF00"/>
+          </a:solidFill>
+          <a:ln>
+            <a:solidFill>
+              <a:schemeClr val="tx1"/>
+            </a:solidFill>
+          </a:ln>
+        </p:spPr>
+        <p:style>
+          <a:lnRef idx="2">
+            <a:schemeClr val="accent1">
+              <a:shade val="50000"/>
+            </a:schemeClr>
+          </a:lnRef>
+          <a:fillRef idx="1">
+            <a:schemeClr val="accent1"/>
+          </a:fillRef>
+          <a:effectRef idx="0">
+            <a:schemeClr val="accent1"/>
+          </a:effectRef>
+          <a:fontRef idx="minor">
+            <a:schemeClr val="lt1"/>
+          </a:fontRef>
+        </p:style>
+        <p:txBody>
+          <a:bodyPr lIns="0" tIns="0" rIns="0" bIns="0" rtlCol="0" anchor="ctr"/>
+          <a:lstStyle/>
+          <a:p>
+            <a:pPr algn="ctr"/>
+            <a:r>
+              <a:rPr kumimoji="1" lang="en-US" altLang="ko-KR" sz="700" b="1" dirty="0" smtClean="0">
+                <a:solidFill>
+                  <a:schemeClr val="tx1"/>
+                </a:solidFill>
+              </a:rPr>
+              <a:t>2</a:t>
+            </a:r>
+            <a:endParaRPr kumimoji="1" lang="ko-KR" altLang="en-US" sz="700" b="1" dirty="0">
+              <a:solidFill>
+                <a:schemeClr val="tx1"/>
+              </a:solidFill>
+            </a:endParaRPr>
+          </a:p>
+        </p:txBody>
+      </p:sp>
+      <p:sp>
+        <p:nvSpPr>
+          <p:cNvPr id="99" name="타원 98"/>
+          <p:cNvSpPr/>
+          <p:nvPr/>
+        </p:nvSpPr>
+        <p:spPr>
+          <a:xfrm>
+            <a:off x="6610652" y="4443700"/>
+            <a:ext cx="150385" cy="165463"/>
+          </a:xfrm>
+          <a:prstGeom prst="ellipse">
+            <a:avLst/>
+          </a:prstGeom>
+          <a:solidFill>
+            <a:srgbClr val="FFFF00"/>
+          </a:solidFill>
+          <a:ln>
+            <a:solidFill>
+              <a:schemeClr val="tx1"/>
+            </a:solidFill>
+          </a:ln>
+        </p:spPr>
+        <p:style>
+          <a:lnRef idx="2">
+            <a:schemeClr val="accent1">
+              <a:shade val="50000"/>
+            </a:schemeClr>
+          </a:lnRef>
+          <a:fillRef idx="1">
+            <a:schemeClr val="accent1"/>
+          </a:fillRef>
+          <a:effectRef idx="0">
+            <a:schemeClr val="accent1"/>
+          </a:effectRef>
+          <a:fontRef idx="minor">
+            <a:schemeClr val="lt1"/>
+          </a:fontRef>
+        </p:style>
+        <p:txBody>
+          <a:bodyPr lIns="0" tIns="0" rIns="0" bIns="0" rtlCol="0" anchor="ctr"/>
+          <a:lstStyle/>
+          <a:p>
+            <a:pPr algn="ctr"/>
+            <a:r>
+              <a:rPr kumimoji="1" lang="en-US" altLang="ko-KR" sz="700" b="1" dirty="0">
+                <a:solidFill>
+                  <a:schemeClr val="tx1"/>
+                </a:solidFill>
+              </a:rPr>
+              <a:t>3</a:t>
+            </a:r>
+            <a:endParaRPr kumimoji="1" lang="ko-KR" altLang="en-US" sz="700" b="1" dirty="0">
+              <a:solidFill>
+                <a:schemeClr val="tx1"/>
+              </a:solidFill>
+            </a:endParaRPr>
+          </a:p>
+        </p:txBody>
+      </p:sp>
+      <p:sp>
+        <p:nvSpPr>
+          <p:cNvPr id="100" name="타원 99"/>
+          <p:cNvSpPr/>
+          <p:nvPr/>
+        </p:nvSpPr>
+        <p:spPr>
+          <a:xfrm>
+            <a:off x="5365641" y="5032430"/>
+            <a:ext cx="150385" cy="165463"/>
+          </a:xfrm>
+          <a:prstGeom prst="ellipse">
+            <a:avLst/>
+          </a:prstGeom>
+          <a:solidFill>
+            <a:srgbClr val="FFFF00"/>
+          </a:solidFill>
+          <a:ln>
+            <a:solidFill>
+              <a:schemeClr val="tx1"/>
+            </a:solidFill>
+          </a:ln>
+        </p:spPr>
+        <p:style>
+          <a:lnRef idx="2">
+            <a:schemeClr val="accent1">
+              <a:shade val="50000"/>
+            </a:schemeClr>
+          </a:lnRef>
+          <a:fillRef idx="1">
+            <a:schemeClr val="accent1"/>
+          </a:fillRef>
+          <a:effectRef idx="0">
+            <a:schemeClr val="accent1"/>
+          </a:effectRef>
+          <a:fontRef idx="minor">
+            <a:schemeClr val="lt1"/>
+          </a:fontRef>
+        </p:style>
+        <p:txBody>
+          <a:bodyPr lIns="0" tIns="0" rIns="0" bIns="0" rtlCol="0" anchor="ctr"/>
+          <a:lstStyle/>
+          <a:p>
+            <a:pPr algn="ctr"/>
+            <a:r>
+              <a:rPr kumimoji="1" lang="en-US" altLang="ko-KR" sz="700" b="1" dirty="0" smtClean="0">
+                <a:solidFill>
+                  <a:schemeClr val="tx1"/>
+                </a:solidFill>
+              </a:rPr>
+              <a:t>4</a:t>
+            </a:r>
+            <a:endParaRPr kumimoji="1" lang="ko-KR" altLang="en-US" sz="700" b="1" dirty="0">
+              <a:solidFill>
+                <a:schemeClr val="tx1"/>
+              </a:solidFill>
+            </a:endParaRPr>
+          </a:p>
+        </p:txBody>
+      </p:sp>
+      <p:sp>
+        <p:nvSpPr>
+          <p:cNvPr id="101" name="타원 100"/>
+          <p:cNvSpPr/>
+          <p:nvPr/>
+        </p:nvSpPr>
+        <p:spPr>
+          <a:xfrm>
+            <a:off x="5894676" y="5925132"/>
+            <a:ext cx="150385" cy="165463"/>
+          </a:xfrm>
+          <a:prstGeom prst="ellipse">
+            <a:avLst/>
+          </a:prstGeom>
+          <a:solidFill>
+            <a:srgbClr val="FFFF00"/>
+          </a:solidFill>
+          <a:ln>
+            <a:solidFill>
+              <a:schemeClr val="tx1"/>
+            </a:solidFill>
+          </a:ln>
+        </p:spPr>
+        <p:style>
+          <a:lnRef idx="2">
+            <a:schemeClr val="accent1">
+              <a:shade val="50000"/>
+            </a:schemeClr>
+          </a:lnRef>
+          <a:fillRef idx="1">
+            <a:schemeClr val="accent1"/>
+          </a:fillRef>
+          <a:effectRef idx="0">
+            <a:schemeClr val="accent1"/>
+          </a:effectRef>
+          <a:fontRef idx="minor">
+            <a:schemeClr val="lt1"/>
+          </a:fontRef>
+        </p:style>
+        <p:txBody>
+          <a:bodyPr lIns="0" tIns="0" rIns="0" bIns="0" rtlCol="0" anchor="ctr"/>
+          <a:lstStyle/>
+          <a:p>
+            <a:pPr algn="ctr"/>
+            <a:r>
+              <a:rPr kumimoji="1" lang="en-US" altLang="ko-KR" sz="700" b="1" dirty="0">
+                <a:solidFill>
+                  <a:schemeClr val="tx1"/>
+                </a:solidFill>
+              </a:rPr>
+              <a:t>5</a:t>
+            </a:r>
+            <a:endParaRPr kumimoji="1" lang="ko-KR" altLang="en-US" sz="700" b="1" dirty="0">
+              <a:solidFill>
+                <a:schemeClr val="tx1"/>
+              </a:solidFill>
+            </a:endParaRPr>
+          </a:p>
+        </p:txBody>
+      </p:sp>
+      <p:sp>
+        <p:nvSpPr>
+          <p:cNvPr id="102" name="타원 101"/>
+          <p:cNvSpPr/>
+          <p:nvPr/>
+        </p:nvSpPr>
+        <p:spPr>
+          <a:xfrm>
+            <a:off x="6327422" y="5937646"/>
+            <a:ext cx="150385" cy="165463"/>
+          </a:xfrm>
+          <a:prstGeom prst="ellipse">
+            <a:avLst/>
+          </a:prstGeom>
+          <a:solidFill>
+            <a:srgbClr val="FFFF00"/>
+          </a:solidFill>
+          <a:ln>
+            <a:solidFill>
+              <a:schemeClr val="tx1"/>
+            </a:solidFill>
+          </a:ln>
+        </p:spPr>
+        <p:style>
+          <a:lnRef idx="2">
+            <a:schemeClr val="accent1">
+              <a:shade val="50000"/>
+            </a:schemeClr>
+          </a:lnRef>
+          <a:fillRef idx="1">
+            <a:schemeClr val="accent1"/>
+          </a:fillRef>
+          <a:effectRef idx="0">
+            <a:schemeClr val="accent1"/>
+          </a:effectRef>
+          <a:fontRef idx="minor">
+            <a:schemeClr val="lt1"/>
+          </a:fontRef>
+        </p:style>
+        <p:txBody>
+          <a:bodyPr lIns="0" tIns="0" rIns="0" bIns="0" rtlCol="0" anchor="ctr"/>
+          <a:lstStyle/>
+          <a:p>
+            <a:pPr algn="ctr"/>
+            <a:r>
+              <a:rPr kumimoji="1" lang="en-US" altLang="ko-KR" sz="700" b="1" dirty="0" smtClean="0">
+                <a:solidFill>
+                  <a:schemeClr val="tx1"/>
+                </a:solidFill>
+              </a:rPr>
+              <a:t>6</a:t>
+            </a:r>
+            <a:endParaRPr kumimoji="1" lang="ko-KR" altLang="en-US" sz="700" b="1" dirty="0">
+              <a:solidFill>
+                <a:schemeClr val="tx1"/>
+              </a:solidFill>
+            </a:endParaRPr>
+          </a:p>
+        </p:txBody>
+      </p:sp>
+      <p:sp>
+        <p:nvSpPr>
+          <p:cNvPr id="103" name="타원 102"/>
+          <p:cNvSpPr/>
+          <p:nvPr/>
+        </p:nvSpPr>
+        <p:spPr>
+          <a:xfrm>
+            <a:off x="6270247" y="5531372"/>
+            <a:ext cx="150385" cy="165463"/>
+          </a:xfrm>
+          <a:prstGeom prst="ellipse">
+            <a:avLst/>
+          </a:prstGeom>
+          <a:solidFill>
+            <a:srgbClr val="FFFF00"/>
+          </a:solidFill>
+          <a:ln>
+            <a:solidFill>
+              <a:schemeClr val="tx1"/>
+            </a:solidFill>
+          </a:ln>
+        </p:spPr>
+        <p:style>
+          <a:lnRef idx="2">
+            <a:schemeClr val="accent1">
+              <a:shade val="50000"/>
+            </a:schemeClr>
+          </a:lnRef>
+          <a:fillRef idx="1">
+            <a:schemeClr val="accent1"/>
+          </a:fillRef>
+          <a:effectRef idx="0">
+            <a:schemeClr val="accent1"/>
+          </a:effectRef>
+          <a:fontRef idx="minor">
+            <a:schemeClr val="lt1"/>
+          </a:fontRef>
+        </p:style>
+        <p:txBody>
+          <a:bodyPr lIns="0" tIns="0" rIns="0" bIns="0" rtlCol="0" anchor="ctr"/>
+          <a:lstStyle/>
+          <a:p>
+            <a:pPr algn="ctr"/>
+            <a:r>
+              <a:rPr kumimoji="1" lang="en-US" altLang="ko-KR" sz="700" b="1" dirty="0">
+                <a:solidFill>
+                  <a:schemeClr val="tx1"/>
+                </a:solidFill>
+              </a:rPr>
+              <a:t>7</a:t>
+            </a:r>
+            <a:endParaRPr kumimoji="1" lang="ko-KR" altLang="en-US" sz="700" b="1" dirty="0">
+              <a:solidFill>
+                <a:schemeClr val="tx1"/>
+              </a:solidFill>
+            </a:endParaRPr>
+          </a:p>
+        </p:txBody>
+      </p:sp>
+      <p:sp>
+        <p:nvSpPr>
+          <p:cNvPr id="104" name="타원 103"/>
+          <p:cNvSpPr/>
+          <p:nvPr/>
+        </p:nvSpPr>
+        <p:spPr>
+          <a:xfrm>
+            <a:off x="6578514" y="4751915"/>
+            <a:ext cx="150385" cy="165463"/>
+          </a:xfrm>
+          <a:prstGeom prst="ellipse">
+            <a:avLst/>
+          </a:prstGeom>
+          <a:solidFill>
+            <a:srgbClr val="FFFF00"/>
+          </a:solidFill>
+          <a:ln>
+            <a:solidFill>
+              <a:schemeClr val="tx1"/>
+            </a:solidFill>
+          </a:ln>
+        </p:spPr>
+        <p:style>
+          <a:lnRef idx="2">
+            <a:schemeClr val="accent1">
+              <a:shade val="50000"/>
+            </a:schemeClr>
+          </a:lnRef>
+          <a:fillRef idx="1">
+            <a:schemeClr val="accent1"/>
+          </a:fillRef>
+          <a:effectRef idx="0">
+            <a:schemeClr val="accent1"/>
+          </a:effectRef>
+          <a:fontRef idx="minor">
+            <a:schemeClr val="lt1"/>
+          </a:fontRef>
+        </p:style>
+        <p:txBody>
+          <a:bodyPr lIns="0" tIns="0" rIns="0" bIns="0" rtlCol="0" anchor="ctr"/>
+          <a:lstStyle/>
+          <a:p>
+            <a:pPr algn="ctr"/>
+            <a:r>
+              <a:rPr kumimoji="1" lang="en-US" altLang="ko-KR" sz="700" b="1" dirty="0" smtClean="0">
+                <a:solidFill>
+                  <a:schemeClr val="tx1"/>
+                </a:solidFill>
+              </a:rPr>
+              <a:t>9</a:t>
+            </a:r>
+            <a:endParaRPr kumimoji="1" lang="ko-KR" altLang="en-US" sz="700" b="1" dirty="0">
+              <a:solidFill>
+                <a:schemeClr val="tx1"/>
+              </a:solidFill>
+            </a:endParaRPr>
+          </a:p>
+        </p:txBody>
+      </p:sp>
+      <p:sp>
+        <p:nvSpPr>
+          <p:cNvPr id="105" name="타원 104"/>
+          <p:cNvSpPr/>
+          <p:nvPr/>
+        </p:nvSpPr>
+        <p:spPr>
+          <a:xfrm>
+            <a:off x="7974245" y="4242297"/>
+            <a:ext cx="150385" cy="165463"/>
+          </a:xfrm>
+          <a:prstGeom prst="ellipse">
+            <a:avLst/>
+          </a:prstGeom>
+          <a:solidFill>
+            <a:srgbClr val="FFFF00"/>
+          </a:solidFill>
+          <a:ln>
+            <a:solidFill>
+              <a:schemeClr val="tx1"/>
+            </a:solidFill>
+          </a:ln>
+        </p:spPr>
+        <p:style>
+          <a:lnRef idx="2">
+            <a:schemeClr val="accent1">
+              <a:shade val="50000"/>
+            </a:schemeClr>
+          </a:lnRef>
+          <a:fillRef idx="1">
+            <a:schemeClr val="accent1"/>
+          </a:fillRef>
+          <a:effectRef idx="0">
+            <a:schemeClr val="accent1"/>
+          </a:effectRef>
+          <a:fontRef idx="minor">
+            <a:schemeClr val="lt1"/>
+          </a:fontRef>
+        </p:style>
+        <p:txBody>
+          <a:bodyPr lIns="0" tIns="0" rIns="0" bIns="0" rtlCol="0" anchor="ctr"/>
+          <a:lstStyle/>
+          <a:p>
+            <a:pPr algn="ctr"/>
+            <a:r>
+              <a:rPr kumimoji="1" lang="en-US" altLang="ko-KR" sz="700" b="1" dirty="0" smtClean="0">
+                <a:solidFill>
+                  <a:schemeClr val="tx1"/>
+                </a:solidFill>
+              </a:rPr>
+              <a:t>10</a:t>
+            </a:r>
+            <a:endParaRPr kumimoji="1" lang="ko-KR" altLang="en-US" sz="700" b="1" dirty="0">
+              <a:solidFill>
+                <a:schemeClr val="tx1"/>
+              </a:solidFill>
+            </a:endParaRPr>
+          </a:p>
+        </p:txBody>
+      </p:sp>
+    </p:spTree>
+    <p:extLst>
+      <p:ext uri="{BB962C8B-B14F-4D97-AF65-F5344CB8AC3E}">
+        <p14:creationId xmlns:p14="http://schemas.microsoft.com/office/powerpoint/2010/main" val="1913324152"/>
       </p:ext>
     </p:extLst>
   </p:cSld>

</xml_diff>